<commit_message>
Statistical analysis on EPA fuel economy dataset: Excel workbook and Powerpoint presentation
</commit_message>
<xml_diff>
--- a/thinkful data analysis capstone.pptx
+++ b/thinkful data analysis capstone.pptx
@@ -13,8 +13,10 @@
     <p:sldId id="265" r:id="rId7"/>
     <p:sldId id="266" r:id="rId8"/>
     <p:sldId id="262" r:id="rId9"/>
-    <p:sldId id="264" r:id="rId10"/>
-    <p:sldId id="263" r:id="rId11"/>
+    <p:sldId id="268" r:id="rId10"/>
+    <p:sldId id="269" r:id="rId11"/>
+    <p:sldId id="264" r:id="rId12"/>
+    <p:sldId id="263" r:id="rId13"/>
   </p:sldIdLst>
   <p:sldSz cx="12192000" cy="6858000"/>
   <p:notesSz cx="6858000" cy="9144000"/>
@@ -1031,6 +1033,313 @@
 </c:chartSpace>
 </file>
 
+<file path=ppt/charts/chart10.xml><?xml version="1.0" encoding="utf-8"?>
+<c:chartSpace xmlns:c="http://schemas.openxmlformats.org/drawingml/2006/chart" xmlns:a="http://schemas.openxmlformats.org/drawingml/2006/main" xmlns:r="http://schemas.openxmlformats.org/officeDocument/2006/relationships" xmlns:c16r2="http://schemas.microsoft.com/office/drawing/2015/06/chart">
+  <c:date1904 val="0"/>
+  <c:lang val="en-US"/>
+  <c:roundedCorners val="0"/>
+  <mc:AlternateContent xmlns:mc="http://schemas.openxmlformats.org/markup-compatibility/2006">
+    <mc:Choice xmlns:c14="http://schemas.microsoft.com/office/drawing/2007/8/2/chart" Requires="c14">
+      <c14:style val="102"/>
+    </mc:Choice>
+    <mc:Fallback>
+      <c:style val="2"/>
+    </mc:Fallback>
+  </mc:AlternateContent>
+  <c:chart>
+    <c:title>
+      <c:overlay val="0"/>
+      <c:spPr>
+        <a:noFill/>
+        <a:ln>
+          <a:noFill/>
+        </a:ln>
+        <a:effectLst/>
+      </c:spPr>
+      <c:txPr>
+        <a:bodyPr rot="0" spcFirstLastPara="1" vertOverflow="ellipsis" vert="horz" wrap="square" anchor="ctr" anchorCtr="1"/>
+        <a:lstStyle/>
+        <a:p>
+          <a:pPr>
+            <a:defRPr sz="1400" b="0" i="0" u="none" strike="noStrike" kern="1200" spc="0" baseline="0">
+              <a:solidFill>
+                <a:schemeClr val="tx1">
+                  <a:lumMod val="65000"/>
+                  <a:lumOff val="35000"/>
+                </a:schemeClr>
+              </a:solidFill>
+              <a:latin typeface="+mn-lt"/>
+              <a:ea typeface="+mn-ea"/>
+              <a:cs typeface="+mn-cs"/>
+            </a:defRPr>
+          </a:pPr>
+          <a:endParaRPr lang="en-US"/>
+        </a:p>
+      </c:txPr>
+    </c:title>
+    <c:autoTitleDeleted val="0"/>
+    <c:plotArea>
+      <c:layout/>
+      <c:barChart>
+        <c:barDir val="col"/>
+        <c:grouping val="clustered"/>
+        <c:varyColors val="0"/>
+        <c:ser>
+          <c:idx val="0"/>
+          <c:order val="0"/>
+          <c:tx>
+            <c:v>Average MPG vs Transmission Type</c:v>
+          </c:tx>
+          <c:spPr>
+            <a:solidFill>
+              <a:schemeClr val="accent1"/>
+            </a:solidFill>
+            <a:ln>
+              <a:noFill/>
+            </a:ln>
+            <a:effectLst/>
+          </c:spPr>
+          <c:invertIfNegative val="0"/>
+          <c:errBars>
+            <c:errBarType val="both"/>
+            <c:errValType val="cust"/>
+            <c:noEndCap val="0"/>
+            <c:plus>
+              <c:numRef>
+                <c:f>'mpg vs transmission'!$I$20</c:f>
+                <c:numCache>
+                  <c:formatCode>General</c:formatCode>
+                  <c:ptCount val="1"/>
+                  <c:pt idx="0">
+                    <c:v>5.6800908826879451E-2</c:v>
+                  </c:pt>
+                </c:numCache>
+              </c:numRef>
+            </c:plus>
+            <c:minus>
+              <c:numRef>
+                <c:f>'mpg vs transmission'!$I$20</c:f>
+                <c:numCache>
+                  <c:formatCode>General</c:formatCode>
+                  <c:ptCount val="1"/>
+                  <c:pt idx="0">
+                    <c:v>5.6800908826879451E-2</c:v>
+                  </c:pt>
+                </c:numCache>
+              </c:numRef>
+            </c:minus>
+            <c:spPr>
+              <a:noFill/>
+              <a:ln w="9525" cap="flat" cmpd="sng" algn="ctr">
+                <a:solidFill>
+                  <a:schemeClr val="tx1">
+                    <a:lumMod val="65000"/>
+                    <a:lumOff val="35000"/>
+                  </a:schemeClr>
+                </a:solidFill>
+                <a:round/>
+              </a:ln>
+              <a:effectLst/>
+            </c:spPr>
+          </c:errBars>
+          <c:cat>
+            <c:strRef>
+              <c:f>'mpg vs transmission'!$I$6:$J$6</c:f>
+              <c:strCache>
+                <c:ptCount val="2"/>
+                <c:pt idx="0">
+                  <c:v>Manual</c:v>
+                </c:pt>
+                <c:pt idx="1">
+                  <c:v>Automatic</c:v>
+                </c:pt>
+              </c:strCache>
+            </c:strRef>
+          </c:cat>
+          <c:val>
+            <c:numRef>
+              <c:f>'mpg vs transmission'!$I$7:$J$7</c:f>
+              <c:numCache>
+                <c:formatCode>General</c:formatCode>
+                <c:ptCount val="2"/>
+                <c:pt idx="0">
+                  <c:v>21.230844627766508</c:v>
+                </c:pt>
+                <c:pt idx="1">
+                  <c:v>19.311807525109785</c:v>
+                </c:pt>
+              </c:numCache>
+            </c:numRef>
+          </c:val>
+          <c:extLst>
+            <c:ext xmlns:c16="http://schemas.microsoft.com/office/drawing/2014/chart" uri="{C3380CC4-5D6E-409C-BE32-E72D297353CC}">
+              <c16:uniqueId val="{00000000-F568-48C5-8E7E-47AA505B7810}"/>
+            </c:ext>
+          </c:extLst>
+        </c:ser>
+        <c:dLbls>
+          <c:showLegendKey val="0"/>
+          <c:showVal val="0"/>
+          <c:showCatName val="0"/>
+          <c:showSerName val="0"/>
+          <c:showPercent val="0"/>
+          <c:showBubbleSize val="0"/>
+        </c:dLbls>
+        <c:gapWidth val="219"/>
+        <c:overlap val="-27"/>
+        <c:axId val="699973392"/>
+        <c:axId val="699993776"/>
+      </c:barChart>
+      <c:catAx>
+        <c:axId val="699973392"/>
+        <c:scaling>
+          <c:orientation val="minMax"/>
+        </c:scaling>
+        <c:delete val="0"/>
+        <c:axPos val="b"/>
+        <c:numFmt formatCode="General" sourceLinked="1"/>
+        <c:majorTickMark val="none"/>
+        <c:minorTickMark val="none"/>
+        <c:tickLblPos val="nextTo"/>
+        <c:spPr>
+          <a:noFill/>
+          <a:ln w="9525" cap="flat" cmpd="sng" algn="ctr">
+            <a:solidFill>
+              <a:schemeClr val="tx1">
+                <a:lumMod val="15000"/>
+                <a:lumOff val="85000"/>
+              </a:schemeClr>
+            </a:solidFill>
+            <a:round/>
+          </a:ln>
+          <a:effectLst/>
+        </c:spPr>
+        <c:txPr>
+          <a:bodyPr rot="-60000000" spcFirstLastPara="1" vertOverflow="ellipsis" vert="horz" wrap="square" anchor="ctr" anchorCtr="1"/>
+          <a:lstStyle/>
+          <a:p>
+            <a:pPr>
+              <a:defRPr sz="900" b="0" i="0" u="none" strike="noStrike" kern="1200" baseline="0">
+                <a:solidFill>
+                  <a:schemeClr val="tx1">
+                    <a:lumMod val="65000"/>
+                    <a:lumOff val="35000"/>
+                  </a:schemeClr>
+                </a:solidFill>
+                <a:latin typeface="+mn-lt"/>
+                <a:ea typeface="+mn-ea"/>
+                <a:cs typeface="+mn-cs"/>
+              </a:defRPr>
+            </a:pPr>
+            <a:endParaRPr lang="en-US"/>
+          </a:p>
+        </c:txPr>
+        <c:crossAx val="699993776"/>
+        <c:crosses val="autoZero"/>
+        <c:auto val="1"/>
+        <c:lblAlgn val="ctr"/>
+        <c:lblOffset val="100"/>
+        <c:noMultiLvlLbl val="0"/>
+      </c:catAx>
+      <c:valAx>
+        <c:axId val="699993776"/>
+        <c:scaling>
+          <c:orientation val="minMax"/>
+          <c:min val="18"/>
+        </c:scaling>
+        <c:delete val="0"/>
+        <c:axPos val="l"/>
+        <c:majorGridlines>
+          <c:spPr>
+            <a:ln w="9525" cap="flat" cmpd="sng" algn="ctr">
+              <a:solidFill>
+                <a:schemeClr val="tx1">
+                  <a:lumMod val="15000"/>
+                  <a:lumOff val="85000"/>
+                </a:schemeClr>
+              </a:solidFill>
+              <a:round/>
+            </a:ln>
+            <a:effectLst/>
+          </c:spPr>
+        </c:majorGridlines>
+        <c:numFmt formatCode="General" sourceLinked="1"/>
+        <c:majorTickMark val="none"/>
+        <c:minorTickMark val="none"/>
+        <c:tickLblPos val="nextTo"/>
+        <c:spPr>
+          <a:noFill/>
+          <a:ln>
+            <a:noFill/>
+          </a:ln>
+          <a:effectLst/>
+        </c:spPr>
+        <c:txPr>
+          <a:bodyPr rot="-60000000" spcFirstLastPara="1" vertOverflow="ellipsis" vert="horz" wrap="square" anchor="ctr" anchorCtr="1"/>
+          <a:lstStyle/>
+          <a:p>
+            <a:pPr>
+              <a:defRPr sz="900" b="0" i="0" u="none" strike="noStrike" kern="1200" baseline="0">
+                <a:solidFill>
+                  <a:schemeClr val="tx1">
+                    <a:lumMod val="65000"/>
+                    <a:lumOff val="35000"/>
+                  </a:schemeClr>
+                </a:solidFill>
+                <a:latin typeface="+mn-lt"/>
+                <a:ea typeface="+mn-ea"/>
+                <a:cs typeface="+mn-cs"/>
+              </a:defRPr>
+            </a:pPr>
+            <a:endParaRPr lang="en-US"/>
+          </a:p>
+        </c:txPr>
+        <c:crossAx val="699973392"/>
+        <c:crosses val="autoZero"/>
+        <c:crossBetween val="between"/>
+      </c:valAx>
+      <c:spPr>
+        <a:noFill/>
+        <a:ln>
+          <a:noFill/>
+        </a:ln>
+        <a:effectLst/>
+      </c:spPr>
+    </c:plotArea>
+    <c:plotVisOnly val="1"/>
+    <c:dispBlanksAs val="gap"/>
+    <c:extLst>
+      <c:ext xmlns:c16r3="http://schemas.microsoft.com/office/drawing/2017/03/chart" uri="{56B9EC1D-385E-4148-901F-78D8002777C0}">
+        <c16r3:dataDisplayOptions16>
+          <c16r3:dispNaAsBlank val="1"/>
+        </c16r3:dataDisplayOptions16>
+      </c:ext>
+    </c:extLst>
+    <c:showDLblsOverMax val="0"/>
+  </c:chart>
+  <c:spPr>
+    <a:noFill/>
+    <a:ln>
+      <a:noFill/>
+    </a:ln>
+    <a:effectLst/>
+  </c:spPr>
+  <c:txPr>
+    <a:bodyPr/>
+    <a:lstStyle/>
+    <a:p>
+      <a:pPr>
+        <a:defRPr/>
+      </a:pPr>
+      <a:endParaRPr lang="en-US"/>
+    </a:p>
+  </c:txPr>
+  <c:externalData r:id="rId3">
+    <c:autoUpdate val="0"/>
+  </c:externalData>
+</c:chartSpace>
+</file>
+
 <file path=ppt/charts/chart2.xml><?xml version="1.0" encoding="utf-8"?>
 <c:chartSpace xmlns:c="http://schemas.openxmlformats.org/drawingml/2006/chart" xmlns:a="http://schemas.openxmlformats.org/drawingml/2006/main" xmlns:r="http://schemas.openxmlformats.org/officeDocument/2006/relationships" xmlns:c16r2="http://schemas.microsoft.com/office/drawing/2015/06/chart">
   <c:date1904 val="0"/>
@@ -3825,7 +4134,7 @@
           <c:idx val="0"/>
           <c:order val="0"/>
           <c:tx>
-            <c:v>Average MPG vs Transmission Type</c:v>
+            <c:v>Average MPG for 2WD vs. 4WD Vehicles</c:v>
           </c:tx>
           <c:spPr>
             <a:solidFill>
@@ -3837,30 +4146,88 @@
             <a:effectLst/>
           </c:spPr>
           <c:invertIfNegative val="0"/>
+          <c:dLbls>
+            <c:numFmt formatCode="#,##0.00" sourceLinked="0"/>
+            <c:spPr>
+              <a:noFill/>
+              <a:ln>
+                <a:noFill/>
+              </a:ln>
+              <a:effectLst/>
+            </c:spPr>
+            <c:txPr>
+              <a:bodyPr rot="0" spcFirstLastPara="1" vertOverflow="ellipsis" vert="horz" wrap="square" lIns="38100" tIns="19050" rIns="38100" bIns="19050" anchor="ctr" anchorCtr="1">
+                <a:spAutoFit/>
+              </a:bodyPr>
+              <a:lstStyle/>
+              <a:p>
+                <a:pPr>
+                  <a:defRPr sz="900" b="0" i="0" u="none" strike="noStrike" kern="1200" baseline="0">
+                    <a:solidFill>
+                      <a:schemeClr val="tx1">
+                        <a:lumMod val="75000"/>
+                        <a:lumOff val="25000"/>
+                      </a:schemeClr>
+                    </a:solidFill>
+                    <a:latin typeface="+mn-lt"/>
+                    <a:ea typeface="+mn-ea"/>
+                    <a:cs typeface="+mn-cs"/>
+                  </a:defRPr>
+                </a:pPr>
+                <a:endParaRPr lang="en-US"/>
+              </a:p>
+            </c:txPr>
+            <c:showLegendKey val="0"/>
+            <c:showVal val="1"/>
+            <c:showCatName val="0"/>
+            <c:showSerName val="0"/>
+            <c:showPercent val="0"/>
+            <c:showBubbleSize val="0"/>
+            <c:showLeaderLines val="0"/>
+            <c:extLst>
+              <c:ext xmlns:c15="http://schemas.microsoft.com/office/drawing/2012/chart" uri="{CE6537A1-D6FC-4f65-9D91-7224C49458BB}">
+                <c15:showLeaderLines val="1"/>
+                <c15:leaderLines>
+                  <c:spPr>
+                    <a:ln w="9525" cap="flat" cmpd="sng" algn="ctr">
+                      <a:solidFill>
+                        <a:schemeClr val="tx1">
+                          <a:lumMod val="35000"/>
+                          <a:lumOff val="65000"/>
+                        </a:schemeClr>
+                      </a:solidFill>
+                      <a:round/>
+                    </a:ln>
+                    <a:effectLst/>
+                  </c:spPr>
+                </c15:leaderLines>
+              </c:ext>
+            </c:extLst>
+          </c:dLbls>
           <c:errBars>
             <c:errBarType val="both"/>
             <c:errValType val="cust"/>
             <c:noEndCap val="0"/>
             <c:plus>
               <c:numRef>
-                <c:f>'mpg vs transmission'!$I$20</c:f>
+                <c:f>'mpg vs 2wd_awd'!$I$21</c:f>
                 <c:numCache>
                   <c:formatCode>General</c:formatCode>
                   <c:ptCount val="1"/>
                   <c:pt idx="0">
-                    <c:v>5.6800908826879451E-2</c:v>
+                    <c:v>4.7591238427869255E-2</c:v>
                   </c:pt>
                 </c:numCache>
               </c:numRef>
             </c:plus>
             <c:minus>
               <c:numRef>
-                <c:f>'mpg vs transmission'!$I$20</c:f>
+                <c:f>'mpg vs 2wd_awd'!$I$21</c:f>
                 <c:numCache>
                   <c:formatCode>General</c:formatCode>
                   <c:ptCount val="1"/>
                   <c:pt idx="0">
-                    <c:v>5.6800908826879451E-2</c:v>
+                    <c:v>4.7591238427869255E-2</c:v>
                   </c:pt>
                 </c:numCache>
               </c:numRef>
@@ -3881,36 +4248,36 @@
           </c:errBars>
           <c:cat>
             <c:strRef>
-              <c:f>'mpg vs transmission'!$I$6:$J$6</c:f>
+              <c:f>'mpg vs 2wd_awd'!$I$7:$J$7</c:f>
               <c:strCache>
                 <c:ptCount val="2"/>
                 <c:pt idx="0">
-                  <c:v>Manual</c:v>
+                  <c:v>Two-Wheel Drive</c:v>
                 </c:pt>
                 <c:pt idx="1">
-                  <c:v>Automatic</c:v>
+                  <c:v>Four-Wheel Drive</c:v>
                 </c:pt>
               </c:strCache>
             </c:strRef>
           </c:cat>
           <c:val>
             <c:numRef>
-              <c:f>'mpg vs transmission'!$I$7:$J$7</c:f>
+              <c:f>'mpg vs 2wd_awd'!$I$8:$J$8</c:f>
               <c:numCache>
                 <c:formatCode>General</c:formatCode>
                 <c:ptCount val="2"/>
                 <c:pt idx="0">
-                  <c:v>21.230844627766508</c:v>
+                  <c:v>20.452049253391902</c:v>
                 </c:pt>
                 <c:pt idx="1">
-                  <c:v>19.311807525109785</c:v>
+                  <c:v>17.773411729521385</c:v>
                 </c:pt>
               </c:numCache>
             </c:numRef>
           </c:val>
           <c:extLst>
             <c:ext xmlns:c16="http://schemas.microsoft.com/office/drawing/2014/chart" uri="{C3380CC4-5D6E-409C-BE32-E72D297353CC}">
-              <c16:uniqueId val="{00000000-F568-48C5-8E7E-47AA505B7810}"/>
+              <c16:uniqueId val="{00000000-8157-453E-97C2-B74F51C1C5DB}"/>
             </c:ext>
           </c:extLst>
         </c:ser>
@@ -3924,11 +4291,11 @@
         </c:dLbls>
         <c:gapWidth val="219"/>
         <c:overlap val="-27"/>
-        <c:axId val="699973392"/>
-        <c:axId val="699993776"/>
+        <c:axId val="364034703"/>
+        <c:axId val="364038447"/>
       </c:barChart>
       <c:catAx>
-        <c:axId val="699973392"/>
+        <c:axId val="364034703"/>
         <c:scaling>
           <c:orientation val="minMax"/>
         </c:scaling>
@@ -3971,7 +4338,7 @@
             <a:endParaRPr lang="en-US"/>
           </a:p>
         </c:txPr>
-        <c:crossAx val="699993776"/>
+        <c:crossAx val="364038447"/>
         <c:crosses val="autoZero"/>
         <c:auto val="1"/>
         <c:lblAlgn val="ctr"/>
@@ -3979,10 +4346,10 @@
         <c:noMultiLvlLbl val="0"/>
       </c:catAx>
       <c:valAx>
-        <c:axId val="699993776"/>
+        <c:axId val="364038447"/>
         <c:scaling>
           <c:orientation val="minMax"/>
-          <c:min val="18"/>
+          <c:min val="0"/>
         </c:scaling>
         <c:delete val="0"/>
         <c:axPos val="l"/>
@@ -4031,9 +4398,343 @@
             <a:endParaRPr lang="en-US"/>
           </a:p>
         </c:txPr>
-        <c:crossAx val="699973392"/>
+        <c:crossAx val="364034703"/>
         <c:crosses val="autoZero"/>
         <c:crossBetween val="between"/>
+      </c:valAx>
+      <c:spPr>
+        <a:noFill/>
+        <a:ln>
+          <a:noFill/>
+        </a:ln>
+        <a:effectLst/>
+      </c:spPr>
+    </c:plotArea>
+    <c:plotVisOnly val="1"/>
+    <c:dispBlanksAs val="gap"/>
+    <c:extLst>
+      <c:ext xmlns:c16r3="http://schemas.microsoft.com/office/drawing/2017/03/chart" uri="{56B9EC1D-385E-4148-901F-78D8002777C0}">
+        <c16r3:dataDisplayOptions16>
+          <c16r3:dispNaAsBlank val="1"/>
+        </c16r3:dataDisplayOptions16>
+      </c:ext>
+    </c:extLst>
+    <c:showDLblsOverMax val="0"/>
+  </c:chart>
+  <c:spPr>
+    <a:noFill/>
+    <a:ln>
+      <a:noFill/>
+    </a:ln>
+    <a:effectLst/>
+  </c:spPr>
+  <c:txPr>
+    <a:bodyPr/>
+    <a:lstStyle/>
+    <a:p>
+      <a:pPr>
+        <a:defRPr/>
+      </a:pPr>
+      <a:endParaRPr lang="en-US"/>
+    </a:p>
+  </c:txPr>
+  <c:externalData r:id="rId3">
+    <c:autoUpdate val="0"/>
+  </c:externalData>
+  <c:userShapes r:id="rId4"/>
+</c:chartSpace>
+</file>
+
+<file path=ppt/charts/chart9.xml><?xml version="1.0" encoding="utf-8"?>
+<c:chartSpace xmlns:c="http://schemas.openxmlformats.org/drawingml/2006/chart" xmlns:a="http://schemas.openxmlformats.org/drawingml/2006/main" xmlns:r="http://schemas.openxmlformats.org/officeDocument/2006/relationships" xmlns:c16r2="http://schemas.microsoft.com/office/drawing/2015/06/chart">
+  <c:date1904 val="0"/>
+  <c:lang val="en-US"/>
+  <c:roundedCorners val="0"/>
+  <mc:AlternateContent xmlns:mc="http://schemas.openxmlformats.org/markup-compatibility/2006">
+    <mc:Choice xmlns:c14="http://schemas.microsoft.com/office/drawing/2007/8/2/chart" Requires="c14">
+      <c14:style val="102"/>
+    </mc:Choice>
+    <mc:Fallback>
+      <c:style val="2"/>
+    </mc:Fallback>
+  </mc:AlternateContent>
+  <c:chart>
+    <c:title>
+      <c:tx>
+        <c:rich>
+          <a:bodyPr rot="0" spcFirstLastPara="1" vertOverflow="ellipsis" vert="horz" wrap="square" anchor="ctr" anchorCtr="1"/>
+          <a:lstStyle/>
+          <a:p>
+            <a:pPr>
+              <a:defRPr sz="1400" b="0" i="0" u="none" strike="noStrike" kern="1200" spc="0" baseline="0">
+                <a:solidFill>
+                  <a:schemeClr val="tx1">
+                    <a:lumMod val="65000"/>
+                    <a:lumOff val="35000"/>
+                  </a:schemeClr>
+                </a:solidFill>
+                <a:latin typeface="+mn-lt"/>
+                <a:ea typeface="+mn-ea"/>
+                <a:cs typeface="+mn-cs"/>
+              </a:defRPr>
+            </a:pPr>
+            <a:r>
+              <a:rPr lang="en-US"/>
+              <a:t>Average MPG for AWD vs. 4WD</a:t>
+            </a:r>
+          </a:p>
+        </c:rich>
+      </c:tx>
+      <c:overlay val="0"/>
+      <c:spPr>
+        <a:noFill/>
+        <a:ln>
+          <a:noFill/>
+        </a:ln>
+        <a:effectLst/>
+      </c:spPr>
+      <c:txPr>
+        <a:bodyPr rot="0" spcFirstLastPara="1" vertOverflow="ellipsis" vert="horz" wrap="square" anchor="ctr" anchorCtr="1"/>
+        <a:lstStyle/>
+        <a:p>
+          <a:pPr>
+            <a:defRPr sz="1400" b="0" i="0" u="none" strike="noStrike" kern="1200" spc="0" baseline="0">
+              <a:solidFill>
+                <a:schemeClr val="tx1">
+                  <a:lumMod val="65000"/>
+                  <a:lumOff val="35000"/>
+                </a:schemeClr>
+              </a:solidFill>
+              <a:latin typeface="+mn-lt"/>
+              <a:ea typeface="+mn-ea"/>
+              <a:cs typeface="+mn-cs"/>
+            </a:defRPr>
+          </a:pPr>
+          <a:endParaRPr lang="en-US"/>
+        </a:p>
+      </c:txPr>
+    </c:title>
+    <c:autoTitleDeleted val="0"/>
+    <c:plotArea>
+      <c:layout/>
+      <c:barChart>
+        <c:barDir val="col"/>
+        <c:grouping val="clustered"/>
+        <c:varyColors val="0"/>
+        <c:ser>
+          <c:idx val="0"/>
+          <c:order val="0"/>
+          <c:tx>
+            <c:v>Average MPG for 4WD vs. AWD</c:v>
+          </c:tx>
+          <c:spPr>
+            <a:solidFill>
+              <a:schemeClr val="accent1"/>
+            </a:solidFill>
+            <a:ln>
+              <a:noFill/>
+            </a:ln>
+            <a:effectLst/>
+          </c:spPr>
+          <c:invertIfNegative val="0"/>
+          <c:errBars>
+            <c:errBarType val="both"/>
+            <c:errValType val="cust"/>
+            <c:noEndCap val="0"/>
+            <c:plus>
+              <c:numRef>
+                <c:f>'mpg vs 4wd_awd'!$I$21</c:f>
+                <c:numCache>
+                  <c:formatCode>General</c:formatCode>
+                  <c:ptCount val="1"/>
+                  <c:pt idx="0">
+                    <c:v>0.10388517098673819</c:v>
+                  </c:pt>
+                </c:numCache>
+              </c:numRef>
+            </c:plus>
+            <c:minus>
+              <c:numRef>
+                <c:f>'mpg vs 4wd_awd'!$I$21</c:f>
+                <c:numCache>
+                  <c:formatCode>General</c:formatCode>
+                  <c:ptCount val="1"/>
+                  <c:pt idx="0">
+                    <c:v>0.10388517098673819</c:v>
+                  </c:pt>
+                </c:numCache>
+              </c:numRef>
+            </c:minus>
+            <c:spPr>
+              <a:noFill/>
+              <a:ln w="9525" cap="flat" cmpd="sng" algn="ctr">
+                <a:solidFill>
+                  <a:schemeClr val="tx1">
+                    <a:lumMod val="65000"/>
+                    <a:lumOff val="35000"/>
+                  </a:schemeClr>
+                </a:solidFill>
+                <a:round/>
+              </a:ln>
+              <a:effectLst/>
+            </c:spPr>
+          </c:errBars>
+          <c:cat>
+            <c:strRef>
+              <c:f>'mpg vs 4wd_awd'!$I$7:$J$7</c:f>
+              <c:strCache>
+                <c:ptCount val="2"/>
+                <c:pt idx="0">
+                  <c:v>All-Wheel Drive</c:v>
+                </c:pt>
+                <c:pt idx="1">
+                  <c:v>Four-Wheel Drive</c:v>
+                </c:pt>
+              </c:strCache>
+            </c:strRef>
+          </c:cat>
+          <c:val>
+            <c:numRef>
+              <c:f>'mpg vs 4wd_awd'!$I$8:$J$8</c:f>
+              <c:numCache>
+                <c:formatCode>General</c:formatCode>
+                <c:ptCount val="2"/>
+                <c:pt idx="0">
+                  <c:v>17.654972579710094</c:v>
+                </c:pt>
+                <c:pt idx="1">
+                  <c:v>18.59789733656174</c:v>
+                </c:pt>
+              </c:numCache>
+            </c:numRef>
+          </c:val>
+          <c:extLst>
+            <c:ext xmlns:c16="http://schemas.microsoft.com/office/drawing/2014/chart" uri="{C3380CC4-5D6E-409C-BE32-E72D297353CC}">
+              <c16:uniqueId val="{00000000-B147-4CE5-A2EC-35C1621E3324}"/>
+            </c:ext>
+          </c:extLst>
+        </c:ser>
+        <c:dLbls>
+          <c:showLegendKey val="0"/>
+          <c:showVal val="0"/>
+          <c:showCatName val="0"/>
+          <c:showSerName val="0"/>
+          <c:showPercent val="0"/>
+          <c:showBubbleSize val="0"/>
+        </c:dLbls>
+        <c:gapWidth val="219"/>
+        <c:overlap val="-27"/>
+        <c:axId val="364034703"/>
+        <c:axId val="364038447"/>
+      </c:barChart>
+      <c:catAx>
+        <c:axId val="364034703"/>
+        <c:scaling>
+          <c:orientation val="minMax"/>
+        </c:scaling>
+        <c:delete val="0"/>
+        <c:axPos val="b"/>
+        <c:numFmt formatCode="General" sourceLinked="1"/>
+        <c:majorTickMark val="none"/>
+        <c:minorTickMark val="none"/>
+        <c:tickLblPos val="nextTo"/>
+        <c:spPr>
+          <a:noFill/>
+          <a:ln w="9525" cap="flat" cmpd="sng" algn="ctr">
+            <a:solidFill>
+              <a:schemeClr val="tx1">
+                <a:lumMod val="15000"/>
+                <a:lumOff val="85000"/>
+              </a:schemeClr>
+            </a:solidFill>
+            <a:round/>
+          </a:ln>
+          <a:effectLst/>
+        </c:spPr>
+        <c:txPr>
+          <a:bodyPr rot="-60000000" spcFirstLastPara="1" vertOverflow="ellipsis" vert="horz" wrap="square" anchor="ctr" anchorCtr="1"/>
+          <a:lstStyle/>
+          <a:p>
+            <a:pPr>
+              <a:defRPr sz="900" b="0" i="0" u="none" strike="noStrike" kern="1200" baseline="0">
+                <a:solidFill>
+                  <a:schemeClr val="tx1">
+                    <a:lumMod val="65000"/>
+                    <a:lumOff val="35000"/>
+                  </a:schemeClr>
+                </a:solidFill>
+                <a:latin typeface="+mn-lt"/>
+                <a:ea typeface="+mn-ea"/>
+                <a:cs typeface="+mn-cs"/>
+              </a:defRPr>
+            </a:pPr>
+            <a:endParaRPr lang="en-US"/>
+          </a:p>
+        </c:txPr>
+        <c:crossAx val="364038447"/>
+        <c:crosses val="autoZero"/>
+        <c:auto val="1"/>
+        <c:lblAlgn val="ctr"/>
+        <c:lblOffset val="100"/>
+        <c:noMultiLvlLbl val="0"/>
+      </c:catAx>
+      <c:valAx>
+        <c:axId val="364038447"/>
+        <c:scaling>
+          <c:orientation val="minMax"/>
+          <c:min val="0"/>
+        </c:scaling>
+        <c:delete val="0"/>
+        <c:axPos val="l"/>
+        <c:majorGridlines>
+          <c:spPr>
+            <a:ln w="9525" cap="flat" cmpd="sng" algn="ctr">
+              <a:solidFill>
+                <a:schemeClr val="tx1">
+                  <a:lumMod val="15000"/>
+                  <a:lumOff val="85000"/>
+                </a:schemeClr>
+              </a:solidFill>
+              <a:round/>
+            </a:ln>
+            <a:effectLst/>
+          </c:spPr>
+        </c:majorGridlines>
+        <c:numFmt formatCode="General" sourceLinked="1"/>
+        <c:majorTickMark val="none"/>
+        <c:minorTickMark val="none"/>
+        <c:tickLblPos val="nextTo"/>
+        <c:spPr>
+          <a:noFill/>
+          <a:ln>
+            <a:noFill/>
+          </a:ln>
+          <a:effectLst/>
+        </c:spPr>
+        <c:txPr>
+          <a:bodyPr rot="-60000000" spcFirstLastPara="1" vertOverflow="ellipsis" vert="horz" wrap="square" anchor="ctr" anchorCtr="1"/>
+          <a:lstStyle/>
+          <a:p>
+            <a:pPr>
+              <a:defRPr sz="900" b="0" i="0" u="none" strike="noStrike" kern="1200" baseline="0">
+                <a:solidFill>
+                  <a:schemeClr val="tx1">
+                    <a:lumMod val="65000"/>
+                    <a:lumOff val="35000"/>
+                  </a:schemeClr>
+                </a:solidFill>
+                <a:latin typeface="+mn-lt"/>
+                <a:ea typeface="+mn-ea"/>
+                <a:cs typeface="+mn-cs"/>
+              </a:defRPr>
+            </a:pPr>
+            <a:endParaRPr lang="en-US"/>
+          </a:p>
+        </c:txPr>
+        <c:crossAx val="364034703"/>
+        <c:crosses val="autoZero"/>
+        <c:crossBetween val="between"/>
+        <c:majorUnit val="5"/>
       </c:valAx>
       <c:spPr>
         <a:noFill/>
@@ -4078,6 +4779,46 @@
 </file>
 
 <file path=ppt/charts/colors1.xml><?xml version="1.0" encoding="utf-8"?>
+<cs:colorStyle xmlns:cs="http://schemas.microsoft.com/office/drawing/2012/chartStyle" xmlns:a="http://schemas.openxmlformats.org/drawingml/2006/main" meth="cycle" id="10">
+  <a:schemeClr val="accent1"/>
+  <a:schemeClr val="accent2"/>
+  <a:schemeClr val="accent3"/>
+  <a:schemeClr val="accent4"/>
+  <a:schemeClr val="accent5"/>
+  <a:schemeClr val="accent6"/>
+  <cs:variation/>
+  <cs:variation>
+    <a:lumMod val="60000"/>
+  </cs:variation>
+  <cs:variation>
+    <a:lumMod val="80000"/>
+    <a:lumOff val="20000"/>
+  </cs:variation>
+  <cs:variation>
+    <a:lumMod val="80000"/>
+  </cs:variation>
+  <cs:variation>
+    <a:lumMod val="60000"/>
+    <a:lumOff val="40000"/>
+  </cs:variation>
+  <cs:variation>
+    <a:lumMod val="50000"/>
+  </cs:variation>
+  <cs:variation>
+    <a:lumMod val="70000"/>
+    <a:lumOff val="30000"/>
+  </cs:variation>
+  <cs:variation>
+    <a:lumMod val="70000"/>
+  </cs:variation>
+  <cs:variation>
+    <a:lumMod val="50000"/>
+    <a:lumOff val="50000"/>
+  </cs:variation>
+</cs:colorStyle>
+</file>
+
+<file path=ppt/charts/colors10.xml><?xml version="1.0" encoding="utf-8"?>
 <cs:colorStyle xmlns:cs="http://schemas.microsoft.com/office/drawing/2012/chartStyle" xmlns:a="http://schemas.openxmlformats.org/drawingml/2006/main" meth="cycle" id="10">
   <a:schemeClr val="accent1"/>
   <a:schemeClr val="accent2"/>
@@ -4397,6 +5138,46 @@
 </cs:colorStyle>
 </file>
 
+<file path=ppt/charts/colors9.xml><?xml version="1.0" encoding="utf-8"?>
+<cs:colorStyle xmlns:cs="http://schemas.microsoft.com/office/drawing/2012/chartStyle" xmlns:a="http://schemas.openxmlformats.org/drawingml/2006/main" meth="cycle" id="10">
+  <a:schemeClr val="accent1"/>
+  <a:schemeClr val="accent2"/>
+  <a:schemeClr val="accent3"/>
+  <a:schemeClr val="accent4"/>
+  <a:schemeClr val="accent5"/>
+  <a:schemeClr val="accent6"/>
+  <cs:variation/>
+  <cs:variation>
+    <a:lumMod val="60000"/>
+  </cs:variation>
+  <cs:variation>
+    <a:lumMod val="80000"/>
+    <a:lumOff val="20000"/>
+  </cs:variation>
+  <cs:variation>
+    <a:lumMod val="80000"/>
+  </cs:variation>
+  <cs:variation>
+    <a:lumMod val="60000"/>
+    <a:lumOff val="40000"/>
+  </cs:variation>
+  <cs:variation>
+    <a:lumMod val="50000"/>
+  </cs:variation>
+  <cs:variation>
+    <a:lumMod val="70000"/>
+    <a:lumOff val="30000"/>
+  </cs:variation>
+  <cs:variation>
+    <a:lumMod val="70000"/>
+  </cs:variation>
+  <cs:variation>
+    <a:lumMod val="50000"/>
+    <a:lumOff val="50000"/>
+  </cs:variation>
+</cs:colorStyle>
+</file>
+
 <file path=ppt/charts/style1.xml><?xml version="1.0" encoding="utf-8"?>
 <cs:chartStyle xmlns:cs="http://schemas.microsoft.com/office/drawing/2012/chartStyle" xmlns:a="http://schemas.openxmlformats.org/drawingml/2006/main" id="201">
   <cs:axisTitle>
@@ -4900,7 +5681,7 @@
 </cs:chartStyle>
 </file>
 
-<file path=ppt/charts/style2.xml><?xml version="1.0" encoding="utf-8"?>
+<file path=ppt/charts/style10.xml><?xml version="1.0" encoding="utf-8"?>
 <cs:chartStyle xmlns:cs="http://schemas.microsoft.com/office/drawing/2012/chartStyle" xmlns:a="http://schemas.openxmlformats.org/drawingml/2006/main" id="201">
   <cs:axisTitle>
     <cs:lnRef idx="0"/>
@@ -5403,7 +6184,7 @@
 </cs:chartStyle>
 </file>
 
-<file path=ppt/charts/style3.xml><?xml version="1.0" encoding="utf-8"?>
+<file path=ppt/charts/style2.xml><?xml version="1.0" encoding="utf-8"?>
 <cs:chartStyle xmlns:cs="http://schemas.microsoft.com/office/drawing/2012/chartStyle" xmlns:a="http://schemas.openxmlformats.org/drawingml/2006/main" id="201">
   <cs:axisTitle>
     <cs:lnRef idx="0"/>
@@ -5906,7 +6687,7 @@
 </cs:chartStyle>
 </file>
 
-<file path=ppt/charts/style4.xml><?xml version="1.0" encoding="utf-8"?>
+<file path=ppt/charts/style3.xml><?xml version="1.0" encoding="utf-8"?>
 <cs:chartStyle xmlns:cs="http://schemas.microsoft.com/office/drawing/2012/chartStyle" xmlns:a="http://schemas.openxmlformats.org/drawingml/2006/main" id="201">
   <cs:axisTitle>
     <cs:lnRef idx="0"/>
@@ -6409,7 +7190,7 @@
 </cs:chartStyle>
 </file>
 
-<file path=ppt/charts/style5.xml><?xml version="1.0" encoding="utf-8"?>
+<file path=ppt/charts/style4.xml><?xml version="1.0" encoding="utf-8"?>
 <cs:chartStyle xmlns:cs="http://schemas.microsoft.com/office/drawing/2012/chartStyle" xmlns:a="http://schemas.openxmlformats.org/drawingml/2006/main" id="201">
   <cs:axisTitle>
     <cs:lnRef idx="0"/>
@@ -6912,7 +7693,7 @@
 </cs:chartStyle>
 </file>
 
-<file path=ppt/charts/style6.xml><?xml version="1.0" encoding="utf-8"?>
+<file path=ppt/charts/style5.xml><?xml version="1.0" encoding="utf-8"?>
 <cs:chartStyle xmlns:cs="http://schemas.microsoft.com/office/drawing/2012/chartStyle" xmlns:a="http://schemas.openxmlformats.org/drawingml/2006/main" id="201">
   <cs:axisTitle>
     <cs:lnRef idx="0"/>
@@ -7415,7 +8196,7 @@
 </cs:chartStyle>
 </file>
 
-<file path=ppt/charts/style7.xml><?xml version="1.0" encoding="utf-8"?>
+<file path=ppt/charts/style6.xml><?xml version="1.0" encoding="utf-8"?>
 <cs:chartStyle xmlns:cs="http://schemas.microsoft.com/office/drawing/2012/chartStyle" xmlns:a="http://schemas.openxmlformats.org/drawingml/2006/main" id="201">
   <cs:axisTitle>
     <cs:lnRef idx="0"/>
@@ -7918,7 +8699,7 @@
 </cs:chartStyle>
 </file>
 
-<file path=ppt/charts/style8.xml><?xml version="1.0" encoding="utf-8"?>
+<file path=ppt/charts/style7.xml><?xml version="1.0" encoding="utf-8"?>
 <cs:chartStyle xmlns:cs="http://schemas.microsoft.com/office/drawing/2012/chartStyle" xmlns:a="http://schemas.openxmlformats.org/drawingml/2006/main" id="201">
   <cs:axisTitle>
     <cs:lnRef idx="0"/>
@@ -8419,6 +9200,1172 @@
     </cs:spPr>
   </cs:wall>
 </cs:chartStyle>
+</file>
+
+<file path=ppt/charts/style8.xml><?xml version="1.0" encoding="utf-8"?>
+<cs:chartStyle xmlns:cs="http://schemas.microsoft.com/office/drawing/2012/chartStyle" xmlns:a="http://schemas.openxmlformats.org/drawingml/2006/main" id="201">
+  <cs:axisTitle>
+    <cs:lnRef idx="0"/>
+    <cs:fillRef idx="0"/>
+    <cs:effectRef idx="0"/>
+    <cs:fontRef idx="minor">
+      <a:schemeClr val="tx1">
+        <a:lumMod val="65000"/>
+        <a:lumOff val="35000"/>
+      </a:schemeClr>
+    </cs:fontRef>
+    <cs:defRPr sz="1000" kern="1200"/>
+  </cs:axisTitle>
+  <cs:categoryAxis>
+    <cs:lnRef idx="0"/>
+    <cs:fillRef idx="0"/>
+    <cs:effectRef idx="0"/>
+    <cs:fontRef idx="minor">
+      <a:schemeClr val="tx1">
+        <a:lumMod val="65000"/>
+        <a:lumOff val="35000"/>
+      </a:schemeClr>
+    </cs:fontRef>
+    <cs:spPr>
+      <a:ln w="9525" cap="flat" cmpd="sng" algn="ctr">
+        <a:solidFill>
+          <a:schemeClr val="tx1">
+            <a:lumMod val="15000"/>
+            <a:lumOff val="85000"/>
+          </a:schemeClr>
+        </a:solidFill>
+        <a:round/>
+      </a:ln>
+    </cs:spPr>
+    <cs:defRPr sz="900" kern="1200"/>
+  </cs:categoryAxis>
+  <cs:chartArea mods="allowNoFillOverride allowNoLineOverride">
+    <cs:lnRef idx="0"/>
+    <cs:fillRef idx="0"/>
+    <cs:effectRef idx="0"/>
+    <cs:fontRef idx="minor">
+      <a:schemeClr val="tx1"/>
+    </cs:fontRef>
+    <cs:spPr>
+      <a:solidFill>
+        <a:schemeClr val="bg1"/>
+      </a:solidFill>
+      <a:ln w="9525" cap="flat" cmpd="sng" algn="ctr">
+        <a:solidFill>
+          <a:schemeClr val="tx1">
+            <a:lumMod val="15000"/>
+            <a:lumOff val="85000"/>
+          </a:schemeClr>
+        </a:solidFill>
+        <a:round/>
+      </a:ln>
+    </cs:spPr>
+    <cs:defRPr sz="1000" kern="1200"/>
+  </cs:chartArea>
+  <cs:dataLabel>
+    <cs:lnRef idx="0"/>
+    <cs:fillRef idx="0"/>
+    <cs:effectRef idx="0"/>
+    <cs:fontRef idx="minor">
+      <a:schemeClr val="tx1">
+        <a:lumMod val="75000"/>
+        <a:lumOff val="25000"/>
+      </a:schemeClr>
+    </cs:fontRef>
+    <cs:defRPr sz="900" kern="1200"/>
+  </cs:dataLabel>
+  <cs:dataLabelCallout>
+    <cs:lnRef idx="0"/>
+    <cs:fillRef idx="0"/>
+    <cs:effectRef idx="0"/>
+    <cs:fontRef idx="minor">
+      <a:schemeClr val="dk1">
+        <a:lumMod val="65000"/>
+        <a:lumOff val="35000"/>
+      </a:schemeClr>
+    </cs:fontRef>
+    <cs:spPr>
+      <a:solidFill>
+        <a:schemeClr val="lt1"/>
+      </a:solidFill>
+      <a:ln>
+        <a:solidFill>
+          <a:schemeClr val="dk1">
+            <a:lumMod val="25000"/>
+            <a:lumOff val="75000"/>
+          </a:schemeClr>
+        </a:solidFill>
+      </a:ln>
+    </cs:spPr>
+    <cs:defRPr sz="900" kern="1200"/>
+    <cs:bodyPr rot="0" spcFirstLastPara="1" vertOverflow="clip" horzOverflow="clip" vert="horz" wrap="square" lIns="36576" tIns="18288" rIns="36576" bIns="18288" anchor="ctr" anchorCtr="1">
+      <a:spAutoFit/>
+    </cs:bodyPr>
+  </cs:dataLabelCallout>
+  <cs:dataPoint>
+    <cs:lnRef idx="0"/>
+    <cs:fillRef idx="1">
+      <cs:styleClr val="auto"/>
+    </cs:fillRef>
+    <cs:effectRef idx="0"/>
+    <cs:fontRef idx="minor">
+      <a:schemeClr val="tx1"/>
+    </cs:fontRef>
+  </cs:dataPoint>
+  <cs:dataPoint3D>
+    <cs:lnRef idx="0"/>
+    <cs:fillRef idx="1">
+      <cs:styleClr val="auto"/>
+    </cs:fillRef>
+    <cs:effectRef idx="0"/>
+    <cs:fontRef idx="minor">
+      <a:schemeClr val="tx1"/>
+    </cs:fontRef>
+  </cs:dataPoint3D>
+  <cs:dataPointLine>
+    <cs:lnRef idx="0">
+      <cs:styleClr val="auto"/>
+    </cs:lnRef>
+    <cs:fillRef idx="1"/>
+    <cs:effectRef idx="0"/>
+    <cs:fontRef idx="minor">
+      <a:schemeClr val="tx1"/>
+    </cs:fontRef>
+    <cs:spPr>
+      <a:ln w="28575" cap="rnd">
+        <a:solidFill>
+          <a:schemeClr val="phClr"/>
+        </a:solidFill>
+        <a:round/>
+      </a:ln>
+    </cs:spPr>
+  </cs:dataPointLine>
+  <cs:dataPointMarker>
+    <cs:lnRef idx="0">
+      <cs:styleClr val="auto"/>
+    </cs:lnRef>
+    <cs:fillRef idx="1">
+      <cs:styleClr val="auto"/>
+    </cs:fillRef>
+    <cs:effectRef idx="0"/>
+    <cs:fontRef idx="minor">
+      <a:schemeClr val="tx1"/>
+    </cs:fontRef>
+    <cs:spPr>
+      <a:ln w="9525">
+        <a:solidFill>
+          <a:schemeClr val="phClr"/>
+        </a:solidFill>
+      </a:ln>
+    </cs:spPr>
+  </cs:dataPointMarker>
+  <cs:dataPointMarkerLayout symbol="circle" size="5"/>
+  <cs:dataPointWireframe>
+    <cs:lnRef idx="0">
+      <cs:styleClr val="auto"/>
+    </cs:lnRef>
+    <cs:fillRef idx="1"/>
+    <cs:effectRef idx="0"/>
+    <cs:fontRef idx="minor">
+      <a:schemeClr val="tx1"/>
+    </cs:fontRef>
+    <cs:spPr>
+      <a:ln w="9525" cap="rnd">
+        <a:solidFill>
+          <a:schemeClr val="phClr"/>
+        </a:solidFill>
+        <a:round/>
+      </a:ln>
+    </cs:spPr>
+  </cs:dataPointWireframe>
+  <cs:dataTable>
+    <cs:lnRef idx="0"/>
+    <cs:fillRef idx="0"/>
+    <cs:effectRef idx="0"/>
+    <cs:fontRef idx="minor">
+      <a:schemeClr val="tx1">
+        <a:lumMod val="65000"/>
+        <a:lumOff val="35000"/>
+      </a:schemeClr>
+    </cs:fontRef>
+    <cs:spPr>
+      <a:noFill/>
+      <a:ln w="9525" cap="flat" cmpd="sng" algn="ctr">
+        <a:solidFill>
+          <a:schemeClr val="tx1">
+            <a:lumMod val="15000"/>
+            <a:lumOff val="85000"/>
+          </a:schemeClr>
+        </a:solidFill>
+        <a:round/>
+      </a:ln>
+    </cs:spPr>
+    <cs:defRPr sz="900" kern="1200"/>
+  </cs:dataTable>
+  <cs:downBar>
+    <cs:lnRef idx="0"/>
+    <cs:fillRef idx="0"/>
+    <cs:effectRef idx="0"/>
+    <cs:fontRef idx="minor">
+      <a:schemeClr val="dk1"/>
+    </cs:fontRef>
+    <cs:spPr>
+      <a:solidFill>
+        <a:schemeClr val="dk1">
+          <a:lumMod val="65000"/>
+          <a:lumOff val="35000"/>
+        </a:schemeClr>
+      </a:solidFill>
+      <a:ln w="9525">
+        <a:solidFill>
+          <a:schemeClr val="tx1">
+            <a:lumMod val="65000"/>
+            <a:lumOff val="35000"/>
+          </a:schemeClr>
+        </a:solidFill>
+      </a:ln>
+    </cs:spPr>
+  </cs:downBar>
+  <cs:dropLine>
+    <cs:lnRef idx="0"/>
+    <cs:fillRef idx="0"/>
+    <cs:effectRef idx="0"/>
+    <cs:fontRef idx="minor">
+      <a:schemeClr val="tx1"/>
+    </cs:fontRef>
+    <cs:spPr>
+      <a:ln w="9525" cap="flat" cmpd="sng" algn="ctr">
+        <a:solidFill>
+          <a:schemeClr val="tx1">
+            <a:lumMod val="35000"/>
+            <a:lumOff val="65000"/>
+          </a:schemeClr>
+        </a:solidFill>
+        <a:round/>
+      </a:ln>
+    </cs:spPr>
+  </cs:dropLine>
+  <cs:errorBar>
+    <cs:lnRef idx="0"/>
+    <cs:fillRef idx="0"/>
+    <cs:effectRef idx="0"/>
+    <cs:fontRef idx="minor">
+      <a:schemeClr val="tx1"/>
+    </cs:fontRef>
+    <cs:spPr>
+      <a:ln w="9525" cap="flat" cmpd="sng" algn="ctr">
+        <a:solidFill>
+          <a:schemeClr val="tx1">
+            <a:lumMod val="65000"/>
+            <a:lumOff val="35000"/>
+          </a:schemeClr>
+        </a:solidFill>
+        <a:round/>
+      </a:ln>
+    </cs:spPr>
+  </cs:errorBar>
+  <cs:floor>
+    <cs:lnRef idx="0"/>
+    <cs:fillRef idx="0"/>
+    <cs:effectRef idx="0"/>
+    <cs:fontRef idx="minor">
+      <a:schemeClr val="tx1"/>
+    </cs:fontRef>
+    <cs:spPr>
+      <a:noFill/>
+      <a:ln>
+        <a:noFill/>
+      </a:ln>
+    </cs:spPr>
+  </cs:floor>
+  <cs:gridlineMajor>
+    <cs:lnRef idx="0"/>
+    <cs:fillRef idx="0"/>
+    <cs:effectRef idx="0"/>
+    <cs:fontRef idx="minor">
+      <a:schemeClr val="tx1"/>
+    </cs:fontRef>
+    <cs:spPr>
+      <a:ln w="9525" cap="flat" cmpd="sng" algn="ctr">
+        <a:solidFill>
+          <a:schemeClr val="tx1">
+            <a:lumMod val="15000"/>
+            <a:lumOff val="85000"/>
+          </a:schemeClr>
+        </a:solidFill>
+        <a:round/>
+      </a:ln>
+    </cs:spPr>
+  </cs:gridlineMajor>
+  <cs:gridlineMinor>
+    <cs:lnRef idx="0"/>
+    <cs:fillRef idx="0"/>
+    <cs:effectRef idx="0"/>
+    <cs:fontRef idx="minor">
+      <a:schemeClr val="tx1"/>
+    </cs:fontRef>
+    <cs:spPr>
+      <a:ln w="9525" cap="flat" cmpd="sng" algn="ctr">
+        <a:solidFill>
+          <a:schemeClr val="tx1">
+            <a:lumMod val="5000"/>
+            <a:lumOff val="95000"/>
+          </a:schemeClr>
+        </a:solidFill>
+        <a:round/>
+      </a:ln>
+    </cs:spPr>
+  </cs:gridlineMinor>
+  <cs:hiLoLine>
+    <cs:lnRef idx="0"/>
+    <cs:fillRef idx="0"/>
+    <cs:effectRef idx="0"/>
+    <cs:fontRef idx="minor">
+      <a:schemeClr val="tx1"/>
+    </cs:fontRef>
+    <cs:spPr>
+      <a:ln w="9525" cap="flat" cmpd="sng" algn="ctr">
+        <a:solidFill>
+          <a:schemeClr val="tx1">
+            <a:lumMod val="75000"/>
+            <a:lumOff val="25000"/>
+          </a:schemeClr>
+        </a:solidFill>
+        <a:round/>
+      </a:ln>
+    </cs:spPr>
+  </cs:hiLoLine>
+  <cs:leaderLine>
+    <cs:lnRef idx="0"/>
+    <cs:fillRef idx="0"/>
+    <cs:effectRef idx="0"/>
+    <cs:fontRef idx="minor">
+      <a:schemeClr val="tx1"/>
+    </cs:fontRef>
+    <cs:spPr>
+      <a:ln w="9525" cap="flat" cmpd="sng" algn="ctr">
+        <a:solidFill>
+          <a:schemeClr val="tx1">
+            <a:lumMod val="35000"/>
+            <a:lumOff val="65000"/>
+          </a:schemeClr>
+        </a:solidFill>
+        <a:round/>
+      </a:ln>
+    </cs:spPr>
+  </cs:leaderLine>
+  <cs:legend>
+    <cs:lnRef idx="0"/>
+    <cs:fillRef idx="0"/>
+    <cs:effectRef idx="0"/>
+    <cs:fontRef idx="minor">
+      <a:schemeClr val="tx1">
+        <a:lumMod val="65000"/>
+        <a:lumOff val="35000"/>
+      </a:schemeClr>
+    </cs:fontRef>
+    <cs:defRPr sz="900" kern="1200"/>
+  </cs:legend>
+  <cs:plotArea mods="allowNoFillOverride allowNoLineOverride">
+    <cs:lnRef idx="0"/>
+    <cs:fillRef idx="0"/>
+    <cs:effectRef idx="0"/>
+    <cs:fontRef idx="minor">
+      <a:schemeClr val="tx1"/>
+    </cs:fontRef>
+  </cs:plotArea>
+  <cs:plotArea3D mods="allowNoFillOverride allowNoLineOverride">
+    <cs:lnRef idx="0"/>
+    <cs:fillRef idx="0"/>
+    <cs:effectRef idx="0"/>
+    <cs:fontRef idx="minor">
+      <a:schemeClr val="tx1"/>
+    </cs:fontRef>
+  </cs:plotArea3D>
+  <cs:seriesAxis>
+    <cs:lnRef idx="0"/>
+    <cs:fillRef idx="0"/>
+    <cs:effectRef idx="0"/>
+    <cs:fontRef idx="minor">
+      <a:schemeClr val="tx1">
+        <a:lumMod val="65000"/>
+        <a:lumOff val="35000"/>
+      </a:schemeClr>
+    </cs:fontRef>
+    <cs:defRPr sz="900" kern="1200"/>
+  </cs:seriesAxis>
+  <cs:seriesLine>
+    <cs:lnRef idx="0"/>
+    <cs:fillRef idx="0"/>
+    <cs:effectRef idx="0"/>
+    <cs:fontRef idx="minor">
+      <a:schemeClr val="tx1"/>
+    </cs:fontRef>
+    <cs:spPr>
+      <a:ln w="9525" cap="flat" cmpd="sng" algn="ctr">
+        <a:solidFill>
+          <a:schemeClr val="tx1">
+            <a:lumMod val="35000"/>
+            <a:lumOff val="65000"/>
+          </a:schemeClr>
+        </a:solidFill>
+        <a:round/>
+      </a:ln>
+    </cs:spPr>
+  </cs:seriesLine>
+  <cs:title>
+    <cs:lnRef idx="0"/>
+    <cs:fillRef idx="0"/>
+    <cs:effectRef idx="0"/>
+    <cs:fontRef idx="minor">
+      <a:schemeClr val="tx1">
+        <a:lumMod val="65000"/>
+        <a:lumOff val="35000"/>
+      </a:schemeClr>
+    </cs:fontRef>
+    <cs:defRPr sz="1400" b="0" kern="1200" spc="0" baseline="0"/>
+  </cs:title>
+  <cs:trendline>
+    <cs:lnRef idx="0">
+      <cs:styleClr val="auto"/>
+    </cs:lnRef>
+    <cs:fillRef idx="0"/>
+    <cs:effectRef idx="0"/>
+    <cs:fontRef idx="minor">
+      <a:schemeClr val="tx1"/>
+    </cs:fontRef>
+    <cs:spPr>
+      <a:ln w="19050" cap="rnd">
+        <a:solidFill>
+          <a:schemeClr val="phClr"/>
+        </a:solidFill>
+        <a:prstDash val="sysDot"/>
+      </a:ln>
+    </cs:spPr>
+  </cs:trendline>
+  <cs:trendlineLabel>
+    <cs:lnRef idx="0"/>
+    <cs:fillRef idx="0"/>
+    <cs:effectRef idx="0"/>
+    <cs:fontRef idx="minor">
+      <a:schemeClr val="tx1">
+        <a:lumMod val="65000"/>
+        <a:lumOff val="35000"/>
+      </a:schemeClr>
+    </cs:fontRef>
+    <cs:defRPr sz="900" kern="1200"/>
+  </cs:trendlineLabel>
+  <cs:upBar>
+    <cs:lnRef idx="0"/>
+    <cs:fillRef idx="0"/>
+    <cs:effectRef idx="0"/>
+    <cs:fontRef idx="minor">
+      <a:schemeClr val="dk1"/>
+    </cs:fontRef>
+    <cs:spPr>
+      <a:solidFill>
+        <a:schemeClr val="lt1"/>
+      </a:solidFill>
+      <a:ln w="9525">
+        <a:solidFill>
+          <a:schemeClr val="tx1">
+            <a:lumMod val="15000"/>
+            <a:lumOff val="85000"/>
+          </a:schemeClr>
+        </a:solidFill>
+      </a:ln>
+    </cs:spPr>
+  </cs:upBar>
+  <cs:valueAxis>
+    <cs:lnRef idx="0"/>
+    <cs:fillRef idx="0"/>
+    <cs:effectRef idx="0"/>
+    <cs:fontRef idx="minor">
+      <a:schemeClr val="tx1">
+        <a:lumMod val="65000"/>
+        <a:lumOff val="35000"/>
+      </a:schemeClr>
+    </cs:fontRef>
+    <cs:defRPr sz="900" kern="1200"/>
+  </cs:valueAxis>
+  <cs:wall>
+    <cs:lnRef idx="0"/>
+    <cs:fillRef idx="0"/>
+    <cs:effectRef idx="0"/>
+    <cs:fontRef idx="minor">
+      <a:schemeClr val="tx1"/>
+    </cs:fontRef>
+    <cs:spPr>
+      <a:noFill/>
+      <a:ln>
+        <a:noFill/>
+      </a:ln>
+    </cs:spPr>
+  </cs:wall>
+</cs:chartStyle>
+</file>
+
+<file path=ppt/charts/style9.xml><?xml version="1.0" encoding="utf-8"?>
+<cs:chartStyle xmlns:cs="http://schemas.microsoft.com/office/drawing/2012/chartStyle" xmlns:a="http://schemas.openxmlformats.org/drawingml/2006/main" id="201">
+  <cs:axisTitle>
+    <cs:lnRef idx="0"/>
+    <cs:fillRef idx="0"/>
+    <cs:effectRef idx="0"/>
+    <cs:fontRef idx="minor">
+      <a:schemeClr val="tx1">
+        <a:lumMod val="65000"/>
+        <a:lumOff val="35000"/>
+      </a:schemeClr>
+    </cs:fontRef>
+    <cs:defRPr sz="1000" kern="1200"/>
+  </cs:axisTitle>
+  <cs:categoryAxis>
+    <cs:lnRef idx="0"/>
+    <cs:fillRef idx="0"/>
+    <cs:effectRef idx="0"/>
+    <cs:fontRef idx="minor">
+      <a:schemeClr val="tx1">
+        <a:lumMod val="65000"/>
+        <a:lumOff val="35000"/>
+      </a:schemeClr>
+    </cs:fontRef>
+    <cs:spPr>
+      <a:ln w="9525" cap="flat" cmpd="sng" algn="ctr">
+        <a:solidFill>
+          <a:schemeClr val="tx1">
+            <a:lumMod val="15000"/>
+            <a:lumOff val="85000"/>
+          </a:schemeClr>
+        </a:solidFill>
+        <a:round/>
+      </a:ln>
+    </cs:spPr>
+    <cs:defRPr sz="900" kern="1200"/>
+  </cs:categoryAxis>
+  <cs:chartArea mods="allowNoFillOverride allowNoLineOverride">
+    <cs:lnRef idx="0"/>
+    <cs:fillRef idx="0"/>
+    <cs:effectRef idx="0"/>
+    <cs:fontRef idx="minor">
+      <a:schemeClr val="tx1"/>
+    </cs:fontRef>
+    <cs:spPr>
+      <a:solidFill>
+        <a:schemeClr val="bg1"/>
+      </a:solidFill>
+      <a:ln w="9525" cap="flat" cmpd="sng" algn="ctr">
+        <a:solidFill>
+          <a:schemeClr val="tx1">
+            <a:lumMod val="15000"/>
+            <a:lumOff val="85000"/>
+          </a:schemeClr>
+        </a:solidFill>
+        <a:round/>
+      </a:ln>
+    </cs:spPr>
+    <cs:defRPr sz="1000" kern="1200"/>
+  </cs:chartArea>
+  <cs:dataLabel>
+    <cs:lnRef idx="0"/>
+    <cs:fillRef idx="0"/>
+    <cs:effectRef idx="0"/>
+    <cs:fontRef idx="minor">
+      <a:schemeClr val="tx1">
+        <a:lumMod val="75000"/>
+        <a:lumOff val="25000"/>
+      </a:schemeClr>
+    </cs:fontRef>
+    <cs:defRPr sz="900" kern="1200"/>
+  </cs:dataLabel>
+  <cs:dataLabelCallout>
+    <cs:lnRef idx="0"/>
+    <cs:fillRef idx="0"/>
+    <cs:effectRef idx="0"/>
+    <cs:fontRef idx="minor">
+      <a:schemeClr val="dk1">
+        <a:lumMod val="65000"/>
+        <a:lumOff val="35000"/>
+      </a:schemeClr>
+    </cs:fontRef>
+    <cs:spPr>
+      <a:solidFill>
+        <a:schemeClr val="lt1"/>
+      </a:solidFill>
+      <a:ln>
+        <a:solidFill>
+          <a:schemeClr val="dk1">
+            <a:lumMod val="25000"/>
+            <a:lumOff val="75000"/>
+          </a:schemeClr>
+        </a:solidFill>
+      </a:ln>
+    </cs:spPr>
+    <cs:defRPr sz="900" kern="1200"/>
+    <cs:bodyPr rot="0" spcFirstLastPara="1" vertOverflow="clip" horzOverflow="clip" vert="horz" wrap="square" lIns="36576" tIns="18288" rIns="36576" bIns="18288" anchor="ctr" anchorCtr="1">
+      <a:spAutoFit/>
+    </cs:bodyPr>
+  </cs:dataLabelCallout>
+  <cs:dataPoint>
+    <cs:lnRef idx="0"/>
+    <cs:fillRef idx="1">
+      <cs:styleClr val="auto"/>
+    </cs:fillRef>
+    <cs:effectRef idx="0"/>
+    <cs:fontRef idx="minor">
+      <a:schemeClr val="tx1"/>
+    </cs:fontRef>
+  </cs:dataPoint>
+  <cs:dataPoint3D>
+    <cs:lnRef idx="0"/>
+    <cs:fillRef idx="1">
+      <cs:styleClr val="auto"/>
+    </cs:fillRef>
+    <cs:effectRef idx="0"/>
+    <cs:fontRef idx="minor">
+      <a:schemeClr val="tx1"/>
+    </cs:fontRef>
+  </cs:dataPoint3D>
+  <cs:dataPointLine>
+    <cs:lnRef idx="0">
+      <cs:styleClr val="auto"/>
+    </cs:lnRef>
+    <cs:fillRef idx="1"/>
+    <cs:effectRef idx="0"/>
+    <cs:fontRef idx="minor">
+      <a:schemeClr val="tx1"/>
+    </cs:fontRef>
+    <cs:spPr>
+      <a:ln w="28575" cap="rnd">
+        <a:solidFill>
+          <a:schemeClr val="phClr"/>
+        </a:solidFill>
+        <a:round/>
+      </a:ln>
+    </cs:spPr>
+  </cs:dataPointLine>
+  <cs:dataPointMarker>
+    <cs:lnRef idx="0">
+      <cs:styleClr val="auto"/>
+    </cs:lnRef>
+    <cs:fillRef idx="1">
+      <cs:styleClr val="auto"/>
+    </cs:fillRef>
+    <cs:effectRef idx="0"/>
+    <cs:fontRef idx="minor">
+      <a:schemeClr val="tx1"/>
+    </cs:fontRef>
+    <cs:spPr>
+      <a:ln w="9525">
+        <a:solidFill>
+          <a:schemeClr val="phClr"/>
+        </a:solidFill>
+      </a:ln>
+    </cs:spPr>
+  </cs:dataPointMarker>
+  <cs:dataPointMarkerLayout symbol="circle" size="5"/>
+  <cs:dataPointWireframe>
+    <cs:lnRef idx="0">
+      <cs:styleClr val="auto"/>
+    </cs:lnRef>
+    <cs:fillRef idx="1"/>
+    <cs:effectRef idx="0"/>
+    <cs:fontRef idx="minor">
+      <a:schemeClr val="tx1"/>
+    </cs:fontRef>
+    <cs:spPr>
+      <a:ln w="9525" cap="rnd">
+        <a:solidFill>
+          <a:schemeClr val="phClr"/>
+        </a:solidFill>
+        <a:round/>
+      </a:ln>
+    </cs:spPr>
+  </cs:dataPointWireframe>
+  <cs:dataTable>
+    <cs:lnRef idx="0"/>
+    <cs:fillRef idx="0"/>
+    <cs:effectRef idx="0"/>
+    <cs:fontRef idx="minor">
+      <a:schemeClr val="tx1">
+        <a:lumMod val="65000"/>
+        <a:lumOff val="35000"/>
+      </a:schemeClr>
+    </cs:fontRef>
+    <cs:spPr>
+      <a:noFill/>
+      <a:ln w="9525" cap="flat" cmpd="sng" algn="ctr">
+        <a:solidFill>
+          <a:schemeClr val="tx1">
+            <a:lumMod val="15000"/>
+            <a:lumOff val="85000"/>
+          </a:schemeClr>
+        </a:solidFill>
+        <a:round/>
+      </a:ln>
+    </cs:spPr>
+    <cs:defRPr sz="900" kern="1200"/>
+  </cs:dataTable>
+  <cs:downBar>
+    <cs:lnRef idx="0"/>
+    <cs:fillRef idx="0"/>
+    <cs:effectRef idx="0"/>
+    <cs:fontRef idx="minor">
+      <a:schemeClr val="dk1"/>
+    </cs:fontRef>
+    <cs:spPr>
+      <a:solidFill>
+        <a:schemeClr val="dk1">
+          <a:lumMod val="65000"/>
+          <a:lumOff val="35000"/>
+        </a:schemeClr>
+      </a:solidFill>
+      <a:ln w="9525">
+        <a:solidFill>
+          <a:schemeClr val="tx1">
+            <a:lumMod val="65000"/>
+            <a:lumOff val="35000"/>
+          </a:schemeClr>
+        </a:solidFill>
+      </a:ln>
+    </cs:spPr>
+  </cs:downBar>
+  <cs:dropLine>
+    <cs:lnRef idx="0"/>
+    <cs:fillRef idx="0"/>
+    <cs:effectRef idx="0"/>
+    <cs:fontRef idx="minor">
+      <a:schemeClr val="tx1"/>
+    </cs:fontRef>
+    <cs:spPr>
+      <a:ln w="9525" cap="flat" cmpd="sng" algn="ctr">
+        <a:solidFill>
+          <a:schemeClr val="tx1">
+            <a:lumMod val="35000"/>
+            <a:lumOff val="65000"/>
+          </a:schemeClr>
+        </a:solidFill>
+        <a:round/>
+      </a:ln>
+    </cs:spPr>
+  </cs:dropLine>
+  <cs:errorBar>
+    <cs:lnRef idx="0"/>
+    <cs:fillRef idx="0"/>
+    <cs:effectRef idx="0"/>
+    <cs:fontRef idx="minor">
+      <a:schemeClr val="tx1"/>
+    </cs:fontRef>
+    <cs:spPr>
+      <a:ln w="9525" cap="flat" cmpd="sng" algn="ctr">
+        <a:solidFill>
+          <a:schemeClr val="tx1">
+            <a:lumMod val="65000"/>
+            <a:lumOff val="35000"/>
+          </a:schemeClr>
+        </a:solidFill>
+        <a:round/>
+      </a:ln>
+    </cs:spPr>
+  </cs:errorBar>
+  <cs:floor>
+    <cs:lnRef idx="0"/>
+    <cs:fillRef idx="0"/>
+    <cs:effectRef idx="0"/>
+    <cs:fontRef idx="minor">
+      <a:schemeClr val="tx1"/>
+    </cs:fontRef>
+    <cs:spPr>
+      <a:noFill/>
+      <a:ln>
+        <a:noFill/>
+      </a:ln>
+    </cs:spPr>
+  </cs:floor>
+  <cs:gridlineMajor>
+    <cs:lnRef idx="0"/>
+    <cs:fillRef idx="0"/>
+    <cs:effectRef idx="0"/>
+    <cs:fontRef idx="minor">
+      <a:schemeClr val="tx1"/>
+    </cs:fontRef>
+    <cs:spPr>
+      <a:ln w="9525" cap="flat" cmpd="sng" algn="ctr">
+        <a:solidFill>
+          <a:schemeClr val="tx1">
+            <a:lumMod val="15000"/>
+            <a:lumOff val="85000"/>
+          </a:schemeClr>
+        </a:solidFill>
+        <a:round/>
+      </a:ln>
+    </cs:spPr>
+  </cs:gridlineMajor>
+  <cs:gridlineMinor>
+    <cs:lnRef idx="0"/>
+    <cs:fillRef idx="0"/>
+    <cs:effectRef idx="0"/>
+    <cs:fontRef idx="minor">
+      <a:schemeClr val="tx1"/>
+    </cs:fontRef>
+    <cs:spPr>
+      <a:ln w="9525" cap="flat" cmpd="sng" algn="ctr">
+        <a:solidFill>
+          <a:schemeClr val="tx1">
+            <a:lumMod val="5000"/>
+            <a:lumOff val="95000"/>
+          </a:schemeClr>
+        </a:solidFill>
+        <a:round/>
+      </a:ln>
+    </cs:spPr>
+  </cs:gridlineMinor>
+  <cs:hiLoLine>
+    <cs:lnRef idx="0"/>
+    <cs:fillRef idx="0"/>
+    <cs:effectRef idx="0"/>
+    <cs:fontRef idx="minor">
+      <a:schemeClr val="tx1"/>
+    </cs:fontRef>
+    <cs:spPr>
+      <a:ln w="9525" cap="flat" cmpd="sng" algn="ctr">
+        <a:solidFill>
+          <a:schemeClr val="tx1">
+            <a:lumMod val="75000"/>
+            <a:lumOff val="25000"/>
+          </a:schemeClr>
+        </a:solidFill>
+        <a:round/>
+      </a:ln>
+    </cs:spPr>
+  </cs:hiLoLine>
+  <cs:leaderLine>
+    <cs:lnRef idx="0"/>
+    <cs:fillRef idx="0"/>
+    <cs:effectRef idx="0"/>
+    <cs:fontRef idx="minor">
+      <a:schemeClr val="tx1"/>
+    </cs:fontRef>
+    <cs:spPr>
+      <a:ln w="9525" cap="flat" cmpd="sng" algn="ctr">
+        <a:solidFill>
+          <a:schemeClr val="tx1">
+            <a:lumMod val="35000"/>
+            <a:lumOff val="65000"/>
+          </a:schemeClr>
+        </a:solidFill>
+        <a:round/>
+      </a:ln>
+    </cs:spPr>
+  </cs:leaderLine>
+  <cs:legend>
+    <cs:lnRef idx="0"/>
+    <cs:fillRef idx="0"/>
+    <cs:effectRef idx="0"/>
+    <cs:fontRef idx="minor">
+      <a:schemeClr val="tx1">
+        <a:lumMod val="65000"/>
+        <a:lumOff val="35000"/>
+      </a:schemeClr>
+    </cs:fontRef>
+    <cs:defRPr sz="900" kern="1200"/>
+  </cs:legend>
+  <cs:plotArea mods="allowNoFillOverride allowNoLineOverride">
+    <cs:lnRef idx="0"/>
+    <cs:fillRef idx="0"/>
+    <cs:effectRef idx="0"/>
+    <cs:fontRef idx="minor">
+      <a:schemeClr val="tx1"/>
+    </cs:fontRef>
+  </cs:plotArea>
+  <cs:plotArea3D mods="allowNoFillOverride allowNoLineOverride">
+    <cs:lnRef idx="0"/>
+    <cs:fillRef idx="0"/>
+    <cs:effectRef idx="0"/>
+    <cs:fontRef idx="minor">
+      <a:schemeClr val="tx1"/>
+    </cs:fontRef>
+  </cs:plotArea3D>
+  <cs:seriesAxis>
+    <cs:lnRef idx="0"/>
+    <cs:fillRef idx="0"/>
+    <cs:effectRef idx="0"/>
+    <cs:fontRef idx="minor">
+      <a:schemeClr val="tx1">
+        <a:lumMod val="65000"/>
+        <a:lumOff val="35000"/>
+      </a:schemeClr>
+    </cs:fontRef>
+    <cs:defRPr sz="900" kern="1200"/>
+  </cs:seriesAxis>
+  <cs:seriesLine>
+    <cs:lnRef idx="0"/>
+    <cs:fillRef idx="0"/>
+    <cs:effectRef idx="0"/>
+    <cs:fontRef idx="minor">
+      <a:schemeClr val="tx1"/>
+    </cs:fontRef>
+    <cs:spPr>
+      <a:ln w="9525" cap="flat" cmpd="sng" algn="ctr">
+        <a:solidFill>
+          <a:schemeClr val="tx1">
+            <a:lumMod val="35000"/>
+            <a:lumOff val="65000"/>
+          </a:schemeClr>
+        </a:solidFill>
+        <a:round/>
+      </a:ln>
+    </cs:spPr>
+  </cs:seriesLine>
+  <cs:title>
+    <cs:lnRef idx="0"/>
+    <cs:fillRef idx="0"/>
+    <cs:effectRef idx="0"/>
+    <cs:fontRef idx="minor">
+      <a:schemeClr val="tx1">
+        <a:lumMod val="65000"/>
+        <a:lumOff val="35000"/>
+      </a:schemeClr>
+    </cs:fontRef>
+    <cs:defRPr sz="1400" b="0" kern="1200" spc="0" baseline="0"/>
+  </cs:title>
+  <cs:trendline>
+    <cs:lnRef idx="0">
+      <cs:styleClr val="auto"/>
+    </cs:lnRef>
+    <cs:fillRef idx="0"/>
+    <cs:effectRef idx="0"/>
+    <cs:fontRef idx="minor">
+      <a:schemeClr val="tx1"/>
+    </cs:fontRef>
+    <cs:spPr>
+      <a:ln w="19050" cap="rnd">
+        <a:solidFill>
+          <a:schemeClr val="phClr"/>
+        </a:solidFill>
+        <a:prstDash val="sysDot"/>
+      </a:ln>
+    </cs:spPr>
+  </cs:trendline>
+  <cs:trendlineLabel>
+    <cs:lnRef idx="0"/>
+    <cs:fillRef idx="0"/>
+    <cs:effectRef idx="0"/>
+    <cs:fontRef idx="minor">
+      <a:schemeClr val="tx1">
+        <a:lumMod val="65000"/>
+        <a:lumOff val="35000"/>
+      </a:schemeClr>
+    </cs:fontRef>
+    <cs:defRPr sz="900" kern="1200"/>
+  </cs:trendlineLabel>
+  <cs:upBar>
+    <cs:lnRef idx="0"/>
+    <cs:fillRef idx="0"/>
+    <cs:effectRef idx="0"/>
+    <cs:fontRef idx="minor">
+      <a:schemeClr val="dk1"/>
+    </cs:fontRef>
+    <cs:spPr>
+      <a:solidFill>
+        <a:schemeClr val="lt1"/>
+      </a:solidFill>
+      <a:ln w="9525">
+        <a:solidFill>
+          <a:schemeClr val="tx1">
+            <a:lumMod val="15000"/>
+            <a:lumOff val="85000"/>
+          </a:schemeClr>
+        </a:solidFill>
+      </a:ln>
+    </cs:spPr>
+  </cs:upBar>
+  <cs:valueAxis>
+    <cs:lnRef idx="0"/>
+    <cs:fillRef idx="0"/>
+    <cs:effectRef idx="0"/>
+    <cs:fontRef idx="minor">
+      <a:schemeClr val="tx1">
+        <a:lumMod val="65000"/>
+        <a:lumOff val="35000"/>
+      </a:schemeClr>
+    </cs:fontRef>
+    <cs:defRPr sz="900" kern="1200"/>
+  </cs:valueAxis>
+  <cs:wall>
+    <cs:lnRef idx="0"/>
+    <cs:fillRef idx="0"/>
+    <cs:effectRef idx="0"/>
+    <cs:fontRef idx="minor">
+      <a:schemeClr val="tx1"/>
+    </cs:fontRef>
+    <cs:spPr>
+      <a:noFill/>
+      <a:ln>
+        <a:noFill/>
+      </a:ln>
+    </cs:spPr>
+  </cs:wall>
+</cs:chartStyle>
+</file>
+
+<file path=ppt/drawings/drawing1.xml><?xml version="1.0" encoding="utf-8"?>
+<c:userShapes xmlns:c="http://schemas.openxmlformats.org/drawingml/2006/chart">
+  <cdr:relSizeAnchor xmlns:cdr="http://schemas.openxmlformats.org/drawingml/2006/chartDrawing">
+    <cdr:from>
+      <cdr:x>0.65293</cdr:x>
+      <cdr:y>0.26079</cdr:y>
+    </cdr:from>
+    <cdr:to>
+      <cdr:x>0.83935</cdr:x>
+      <cdr:y>1</cdr:y>
+    </cdr:to>
+    <cdr:sp macro="" textlink="">
+      <cdr:nvSpPr>
+        <cdr:cNvPr id="2" name="Rectangle: Rounded Corners 1">
+          <a:extLst xmlns:a="http://schemas.openxmlformats.org/drawingml/2006/main">
+            <a:ext uri="{FF2B5EF4-FFF2-40B4-BE49-F238E27FC236}">
+              <a16:creationId xmlns:a16="http://schemas.microsoft.com/office/drawing/2014/main" id="{8F7E5B0F-D0DB-495F-8ADE-2E6EE9060C10}"/>
+            </a:ext>
+          </a:extLst>
+        </cdr:cNvPr>
+        <cdr:cNvSpPr/>
+      </cdr:nvSpPr>
+      <cdr:spPr>
+        <a:xfrm xmlns:a="http://schemas.openxmlformats.org/drawingml/2006/main">
+          <a:off x="4966252" y="1076602"/>
+          <a:ext cx="1417983" cy="3051619"/>
+        </a:xfrm>
+        <a:prstGeom xmlns:a="http://schemas.openxmlformats.org/drawingml/2006/main" prst="roundRect">
+          <a:avLst/>
+        </a:prstGeom>
+        <a:noFill xmlns:a="http://schemas.openxmlformats.org/drawingml/2006/main"/>
+        <a:ln xmlns:a="http://schemas.openxmlformats.org/drawingml/2006/main">
+          <a:solidFill>
+            <a:srgbClr val="FF0000"/>
+          </a:solidFill>
+        </a:ln>
+      </cdr:spPr>
+      <cdr:style>
+        <a:lnRef xmlns:a="http://schemas.openxmlformats.org/drawingml/2006/main" idx="2">
+          <a:schemeClr val="accent1">
+            <a:shade val="50000"/>
+          </a:schemeClr>
+        </a:lnRef>
+        <a:fillRef xmlns:a="http://schemas.openxmlformats.org/drawingml/2006/main" idx="1">
+          <a:schemeClr val="accent1"/>
+        </a:fillRef>
+        <a:effectRef xmlns:a="http://schemas.openxmlformats.org/drawingml/2006/main" idx="0">
+          <a:schemeClr val="accent1"/>
+        </a:effectRef>
+        <a:fontRef xmlns:a="http://schemas.openxmlformats.org/drawingml/2006/main" idx="minor">
+          <a:schemeClr val="lt1"/>
+        </a:fontRef>
+      </cdr:style>
+      <cdr:txBody>
+        <a:bodyPr xmlns:a="http://schemas.openxmlformats.org/drawingml/2006/main" rtlCol="0" anchor="ctr"/>
+        <a:lstStyle xmlns:a="http://schemas.openxmlformats.org/drawingml/2006/main">
+          <a:defPPr>
+            <a:defRPr lang="en-US"/>
+          </a:defPPr>
+          <a:lvl1pPr marL="0" algn="l" defTabSz="914400" rtl="0" eaLnBrk="1" latinLnBrk="0" hangingPunct="1">
+            <a:defRPr sz="1800" kern="1200">
+              <a:solidFill>
+                <a:schemeClr val="lt1"/>
+              </a:solidFill>
+              <a:latin typeface="+mn-lt"/>
+              <a:ea typeface="+mn-ea"/>
+              <a:cs typeface="+mn-cs"/>
+            </a:defRPr>
+          </a:lvl1pPr>
+          <a:lvl2pPr marL="457200" algn="l" defTabSz="914400" rtl="0" eaLnBrk="1" latinLnBrk="0" hangingPunct="1">
+            <a:defRPr sz="1800" kern="1200">
+              <a:solidFill>
+                <a:schemeClr val="lt1"/>
+              </a:solidFill>
+              <a:latin typeface="+mn-lt"/>
+              <a:ea typeface="+mn-ea"/>
+              <a:cs typeface="+mn-cs"/>
+            </a:defRPr>
+          </a:lvl2pPr>
+          <a:lvl3pPr marL="914400" algn="l" defTabSz="914400" rtl="0" eaLnBrk="1" latinLnBrk="0" hangingPunct="1">
+            <a:defRPr sz="1800" kern="1200">
+              <a:solidFill>
+                <a:schemeClr val="lt1"/>
+              </a:solidFill>
+              <a:latin typeface="+mn-lt"/>
+              <a:ea typeface="+mn-ea"/>
+              <a:cs typeface="+mn-cs"/>
+            </a:defRPr>
+          </a:lvl3pPr>
+          <a:lvl4pPr marL="1371600" algn="l" defTabSz="914400" rtl="0" eaLnBrk="1" latinLnBrk="0" hangingPunct="1">
+            <a:defRPr sz="1800" kern="1200">
+              <a:solidFill>
+                <a:schemeClr val="lt1"/>
+              </a:solidFill>
+              <a:latin typeface="+mn-lt"/>
+              <a:ea typeface="+mn-ea"/>
+              <a:cs typeface="+mn-cs"/>
+            </a:defRPr>
+          </a:lvl4pPr>
+          <a:lvl5pPr marL="1828800" algn="l" defTabSz="914400" rtl="0" eaLnBrk="1" latinLnBrk="0" hangingPunct="1">
+            <a:defRPr sz="1800" kern="1200">
+              <a:solidFill>
+                <a:schemeClr val="lt1"/>
+              </a:solidFill>
+              <a:latin typeface="+mn-lt"/>
+              <a:ea typeface="+mn-ea"/>
+              <a:cs typeface="+mn-cs"/>
+            </a:defRPr>
+          </a:lvl5pPr>
+          <a:lvl6pPr marL="2286000" algn="l" defTabSz="914400" rtl="0" eaLnBrk="1" latinLnBrk="0" hangingPunct="1">
+            <a:defRPr sz="1800" kern="1200">
+              <a:solidFill>
+                <a:schemeClr val="lt1"/>
+              </a:solidFill>
+              <a:latin typeface="+mn-lt"/>
+              <a:ea typeface="+mn-ea"/>
+              <a:cs typeface="+mn-cs"/>
+            </a:defRPr>
+          </a:lvl6pPr>
+          <a:lvl7pPr marL="2743200" algn="l" defTabSz="914400" rtl="0" eaLnBrk="1" latinLnBrk="0" hangingPunct="1">
+            <a:defRPr sz="1800" kern="1200">
+              <a:solidFill>
+                <a:schemeClr val="lt1"/>
+              </a:solidFill>
+              <a:latin typeface="+mn-lt"/>
+              <a:ea typeface="+mn-ea"/>
+              <a:cs typeface="+mn-cs"/>
+            </a:defRPr>
+          </a:lvl7pPr>
+          <a:lvl8pPr marL="3200400" algn="l" defTabSz="914400" rtl="0" eaLnBrk="1" latinLnBrk="0" hangingPunct="1">
+            <a:defRPr sz="1800" kern="1200">
+              <a:solidFill>
+                <a:schemeClr val="lt1"/>
+              </a:solidFill>
+              <a:latin typeface="+mn-lt"/>
+              <a:ea typeface="+mn-ea"/>
+              <a:cs typeface="+mn-cs"/>
+            </a:defRPr>
+          </a:lvl8pPr>
+          <a:lvl9pPr marL="3657600" algn="l" defTabSz="914400" rtl="0" eaLnBrk="1" latinLnBrk="0" hangingPunct="1">
+            <a:defRPr sz="1800" kern="1200">
+              <a:solidFill>
+                <a:schemeClr val="lt1"/>
+              </a:solidFill>
+              <a:latin typeface="+mn-lt"/>
+              <a:ea typeface="+mn-ea"/>
+              <a:cs typeface="+mn-cs"/>
+            </a:defRPr>
+          </a:lvl9pPr>
+        </a:lstStyle>
+        <a:p xmlns:a="http://schemas.openxmlformats.org/drawingml/2006/main">
+          <a:pPr algn="ctr"/>
+          <a:endParaRPr lang="en-US"/>
+        </a:p>
+      </cdr:txBody>
+    </cdr:sp>
+  </cdr:relSizeAnchor>
+</c:userShapes>
 </file>
 
 <file path=ppt/slideLayouts/slideLayout1.xml><?xml version="1.0" encoding="utf-8"?>
@@ -8568,7 +10515,7 @@
           <a:p>
             <a:fld id="{E5A7D4BA-5648-45BA-A5D4-1F7458D15DC5}" type="datetimeFigureOut">
               <a:rPr lang="en-US" smtClean="0"/>
-              <a:t>3/20/2021</a:t>
+              <a:t>3/22/2021</a:t>
             </a:fld>
             <a:endParaRPr lang="en-US"/>
           </a:p>
@@ -8766,7 +10713,7 @@
           <a:p>
             <a:fld id="{E5A7D4BA-5648-45BA-A5D4-1F7458D15DC5}" type="datetimeFigureOut">
               <a:rPr lang="en-US" smtClean="0"/>
-              <a:t>3/20/2021</a:t>
+              <a:t>3/22/2021</a:t>
             </a:fld>
             <a:endParaRPr lang="en-US"/>
           </a:p>
@@ -8974,7 +10921,7 @@
           <a:p>
             <a:fld id="{E5A7D4BA-5648-45BA-A5D4-1F7458D15DC5}" type="datetimeFigureOut">
               <a:rPr lang="en-US" smtClean="0"/>
-              <a:t>3/20/2021</a:t>
+              <a:t>3/22/2021</a:t>
             </a:fld>
             <a:endParaRPr lang="en-US"/>
           </a:p>
@@ -9172,7 +11119,7 @@
           <a:p>
             <a:fld id="{E5A7D4BA-5648-45BA-A5D4-1F7458D15DC5}" type="datetimeFigureOut">
               <a:rPr lang="en-US" smtClean="0"/>
-              <a:t>3/20/2021</a:t>
+              <a:t>3/22/2021</a:t>
             </a:fld>
             <a:endParaRPr lang="en-US"/>
           </a:p>
@@ -9447,7 +11394,7 @@
           <a:p>
             <a:fld id="{E5A7D4BA-5648-45BA-A5D4-1F7458D15DC5}" type="datetimeFigureOut">
               <a:rPr lang="en-US" smtClean="0"/>
-              <a:t>3/20/2021</a:t>
+              <a:t>3/22/2021</a:t>
             </a:fld>
             <a:endParaRPr lang="en-US"/>
           </a:p>
@@ -9712,7 +11659,7 @@
           <a:p>
             <a:fld id="{E5A7D4BA-5648-45BA-A5D4-1F7458D15DC5}" type="datetimeFigureOut">
               <a:rPr lang="en-US" smtClean="0"/>
-              <a:t>3/20/2021</a:t>
+              <a:t>3/22/2021</a:t>
             </a:fld>
             <a:endParaRPr lang="en-US"/>
           </a:p>
@@ -10124,7 +12071,7 @@
           <a:p>
             <a:fld id="{E5A7D4BA-5648-45BA-A5D4-1F7458D15DC5}" type="datetimeFigureOut">
               <a:rPr lang="en-US" smtClean="0"/>
-              <a:t>3/20/2021</a:t>
+              <a:t>3/22/2021</a:t>
             </a:fld>
             <a:endParaRPr lang="en-US"/>
           </a:p>
@@ -10265,7 +12212,7 @@
           <a:p>
             <a:fld id="{E5A7D4BA-5648-45BA-A5D4-1F7458D15DC5}" type="datetimeFigureOut">
               <a:rPr lang="en-US" smtClean="0"/>
-              <a:t>3/20/2021</a:t>
+              <a:t>3/22/2021</a:t>
             </a:fld>
             <a:endParaRPr lang="en-US"/>
           </a:p>
@@ -10378,7 +12325,7 @@
           <a:p>
             <a:fld id="{E5A7D4BA-5648-45BA-A5D4-1F7458D15DC5}" type="datetimeFigureOut">
               <a:rPr lang="en-US" smtClean="0"/>
-              <a:t>3/20/2021</a:t>
+              <a:t>3/22/2021</a:t>
             </a:fld>
             <a:endParaRPr lang="en-US"/>
           </a:p>
@@ -10689,7 +12636,7 @@
           <a:p>
             <a:fld id="{E5A7D4BA-5648-45BA-A5D4-1F7458D15DC5}" type="datetimeFigureOut">
               <a:rPr lang="en-US" smtClean="0"/>
-              <a:t>3/20/2021</a:t>
+              <a:t>3/22/2021</a:t>
             </a:fld>
             <a:endParaRPr lang="en-US"/>
           </a:p>
@@ -10977,7 +12924,7 @@
           <a:p>
             <a:fld id="{E5A7D4BA-5648-45BA-A5D4-1F7458D15DC5}" type="datetimeFigureOut">
               <a:rPr lang="en-US" smtClean="0"/>
-              <a:t>3/20/2021</a:t>
+              <a:t>3/22/2021</a:t>
             </a:fld>
             <a:endParaRPr lang="en-US"/>
           </a:p>
@@ -11218,7 +13165,7 @@
           <a:p>
             <a:fld id="{E5A7D4BA-5648-45BA-A5D4-1F7458D15DC5}" type="datetimeFigureOut">
               <a:rPr lang="en-US" smtClean="0"/>
-              <a:t>3/20/2021</a:t>
+              <a:t>3/22/2021</a:t>
             </a:fld>
             <a:endParaRPr lang="en-US"/>
           </a:p>
@@ -11745,7 +13692,266 @@
             <a:pPr algn="ctr"/>
             <a:r>
               <a:rPr lang="en-US" b="1" dirty="0"/>
-              <a:t>Consumer Insights</a:t>
+              <a:t>Four-Wheel Drive vs. All-Wheel Drive</a:t>
+            </a:r>
+          </a:p>
+        </p:txBody>
+      </p:sp>
+      <p:sp>
+        <p:nvSpPr>
+          <p:cNvPr id="3" name="Content Placeholder 2">
+            <a:extLst>
+              <a:ext uri="{FF2B5EF4-FFF2-40B4-BE49-F238E27FC236}">
+                <a16:creationId xmlns:a16="http://schemas.microsoft.com/office/drawing/2014/main" id="{1888701C-181C-458E-A335-FD03E106F180}"/>
+              </a:ext>
+            </a:extLst>
+          </p:cNvPr>
+          <p:cNvSpPr>
+            <a:spLocks noGrp="1"/>
+          </p:cNvSpPr>
+          <p:nvPr>
+            <p:ph idx="1"/>
+          </p:nvPr>
+        </p:nvSpPr>
+        <p:spPr>
+          <a:xfrm>
+            <a:off x="127001" y="1825625"/>
+            <a:ext cx="4237182" cy="4351338"/>
+          </a:xfrm>
+        </p:spPr>
+        <p:txBody>
+          <a:bodyPr/>
+          <a:lstStyle/>
+          <a:p>
+            <a:r>
+              <a:rPr lang="en-US" dirty="0"/>
+              <a:t>Statistically significant results at a 99% confidence level</a:t>
+            </a:r>
+          </a:p>
+          <a:p>
+            <a:r>
+              <a:rPr lang="en-US" dirty="0"/>
+              <a:t>4WD has a slight edge in average MPG</a:t>
+            </a:r>
+          </a:p>
+        </p:txBody>
+      </p:sp>
+      <p:graphicFrame>
+        <p:nvGraphicFramePr>
+          <p:cNvPr id="5" name="Chart 4">
+            <a:extLst>
+              <a:ext uri="{FF2B5EF4-FFF2-40B4-BE49-F238E27FC236}">
+                <a16:creationId xmlns:a16="http://schemas.microsoft.com/office/drawing/2014/main" id="{DED9AD85-AB40-4079-B28F-FE0082859171}"/>
+              </a:ext>
+            </a:extLst>
+          </p:cNvPr>
+          <p:cNvGraphicFramePr>
+            <a:graphicFrameLocks/>
+          </p:cNvGraphicFramePr>
+          <p:nvPr>
+            <p:extLst>
+              <p:ext uri="{D42A27DB-BD31-4B8C-83A1-F6EECF244321}">
+                <p14:modId xmlns:p14="http://schemas.microsoft.com/office/powerpoint/2010/main" val="4151179553"/>
+              </p:ext>
+            </p:extLst>
+          </p:nvPr>
+        </p:nvGraphicFramePr>
+        <p:xfrm>
+          <a:off x="4364183" y="1690687"/>
+          <a:ext cx="7700816" cy="4351337"/>
+        </p:xfrm>
+        <a:graphic>
+          <a:graphicData uri="http://schemas.openxmlformats.org/drawingml/2006/chart">
+            <c:chart xmlns:c="http://schemas.openxmlformats.org/drawingml/2006/chart" xmlns:r="http://schemas.openxmlformats.org/officeDocument/2006/relationships" r:id="rId2"/>
+          </a:graphicData>
+        </a:graphic>
+      </p:graphicFrame>
+    </p:spTree>
+    <p:extLst>
+      <p:ext uri="{BB962C8B-B14F-4D97-AF65-F5344CB8AC3E}">
+        <p14:creationId xmlns:p14="http://schemas.microsoft.com/office/powerpoint/2010/main" val="2589308506"/>
+      </p:ext>
+    </p:extLst>
+  </p:cSld>
+  <p:clrMapOvr>
+    <a:masterClrMapping/>
+  </p:clrMapOvr>
+</p:sld>
+</file>
+
+<file path=ppt/slides/slide11.xml><?xml version="1.0" encoding="utf-8"?>
+<p:sld xmlns:a="http://schemas.openxmlformats.org/drawingml/2006/main" xmlns:r="http://schemas.openxmlformats.org/officeDocument/2006/relationships" xmlns:p="http://schemas.openxmlformats.org/presentationml/2006/main">
+  <p:cSld>
+    <p:spTree>
+      <p:nvGrpSpPr>
+        <p:cNvPr id="1" name=""/>
+        <p:cNvGrpSpPr/>
+        <p:nvPr/>
+      </p:nvGrpSpPr>
+      <p:grpSpPr>
+        <a:xfrm>
+          <a:off x="0" y="0"/>
+          <a:ext cx="0" cy="0"/>
+          <a:chOff x="0" y="0"/>
+          <a:chExt cx="0" cy="0"/>
+        </a:xfrm>
+      </p:grpSpPr>
+      <p:sp>
+        <p:nvSpPr>
+          <p:cNvPr id="2" name="Title 1">
+            <a:extLst>
+              <a:ext uri="{FF2B5EF4-FFF2-40B4-BE49-F238E27FC236}">
+                <a16:creationId xmlns:a16="http://schemas.microsoft.com/office/drawing/2014/main" id="{ECF0ABBD-1646-4677-8FD2-39D3AD390119}"/>
+              </a:ext>
+            </a:extLst>
+          </p:cNvPr>
+          <p:cNvSpPr>
+            <a:spLocks noGrp="1"/>
+          </p:cNvSpPr>
+          <p:nvPr>
+            <p:ph type="title"/>
+          </p:nvPr>
+        </p:nvSpPr>
+        <p:spPr/>
+        <p:txBody>
+          <a:bodyPr/>
+          <a:lstStyle/>
+          <a:p>
+            <a:pPr algn="ctr"/>
+            <a:r>
+              <a:rPr lang="en-US" b="1" dirty="0"/>
+              <a:t>Manual vs. Automatic Transmission</a:t>
+            </a:r>
+          </a:p>
+        </p:txBody>
+      </p:sp>
+      <p:sp>
+        <p:nvSpPr>
+          <p:cNvPr id="3" name="Content Placeholder 2">
+            <a:extLst>
+              <a:ext uri="{FF2B5EF4-FFF2-40B4-BE49-F238E27FC236}">
+                <a16:creationId xmlns:a16="http://schemas.microsoft.com/office/drawing/2014/main" id="{1888701C-181C-458E-A335-FD03E106F180}"/>
+              </a:ext>
+            </a:extLst>
+          </p:cNvPr>
+          <p:cNvSpPr>
+            <a:spLocks noGrp="1"/>
+          </p:cNvSpPr>
+          <p:nvPr>
+            <p:ph idx="1"/>
+          </p:nvPr>
+        </p:nvSpPr>
+        <p:spPr>
+          <a:xfrm>
+            <a:off x="127000" y="1825625"/>
+            <a:ext cx="4237183" cy="4351338"/>
+          </a:xfrm>
+        </p:spPr>
+        <p:txBody>
+          <a:bodyPr/>
+          <a:lstStyle/>
+          <a:p>
+            <a:r>
+              <a:rPr lang="en-US" dirty="0"/>
+              <a:t>Manual transmissions have better MPG than automatic transmissions (99% confidence level)</a:t>
+            </a:r>
+          </a:p>
+          <a:p>
+            <a:r>
+              <a:rPr lang="en-US" dirty="0"/>
+              <a:t>These statistics are important to help customers be fuel-conscious while buying cars that fit their needs</a:t>
+            </a:r>
+          </a:p>
+          <a:p>
+            <a:endParaRPr lang="en-US" dirty="0"/>
+          </a:p>
+        </p:txBody>
+      </p:sp>
+      <p:graphicFrame>
+        <p:nvGraphicFramePr>
+          <p:cNvPr id="6" name="Chart 5">
+            <a:extLst>
+              <a:ext uri="{FF2B5EF4-FFF2-40B4-BE49-F238E27FC236}">
+                <a16:creationId xmlns:a16="http://schemas.microsoft.com/office/drawing/2014/main" id="{8C5AE900-8F5D-4C59-85CB-44D6763C68D7}"/>
+              </a:ext>
+            </a:extLst>
+          </p:cNvPr>
+          <p:cNvGraphicFramePr>
+            <a:graphicFrameLocks/>
+          </p:cNvGraphicFramePr>
+          <p:nvPr>
+            <p:extLst>
+              <p:ext uri="{D42A27DB-BD31-4B8C-83A1-F6EECF244321}">
+                <p14:modId xmlns:p14="http://schemas.microsoft.com/office/powerpoint/2010/main" val="3997737167"/>
+              </p:ext>
+            </p:extLst>
+          </p:nvPr>
+        </p:nvGraphicFramePr>
+        <p:xfrm>
+          <a:off x="4364183" y="1825625"/>
+          <a:ext cx="7578436" cy="4242666"/>
+        </p:xfrm>
+        <a:graphic>
+          <a:graphicData uri="http://schemas.openxmlformats.org/drawingml/2006/chart">
+            <c:chart xmlns:c="http://schemas.openxmlformats.org/drawingml/2006/chart" xmlns:r="http://schemas.openxmlformats.org/officeDocument/2006/relationships" r:id="rId2"/>
+          </a:graphicData>
+        </a:graphic>
+      </p:graphicFrame>
+    </p:spTree>
+    <p:extLst>
+      <p:ext uri="{BB962C8B-B14F-4D97-AF65-F5344CB8AC3E}">
+        <p14:creationId xmlns:p14="http://schemas.microsoft.com/office/powerpoint/2010/main" val="793772987"/>
+      </p:ext>
+    </p:extLst>
+  </p:cSld>
+  <p:clrMapOvr>
+    <a:masterClrMapping/>
+  </p:clrMapOvr>
+</p:sld>
+</file>
+
+<file path=ppt/slides/slide12.xml><?xml version="1.0" encoding="utf-8"?>
+<p:sld xmlns:a="http://schemas.openxmlformats.org/drawingml/2006/main" xmlns:r="http://schemas.openxmlformats.org/officeDocument/2006/relationships" xmlns:p="http://schemas.openxmlformats.org/presentationml/2006/main">
+  <p:cSld>
+    <p:spTree>
+      <p:nvGrpSpPr>
+        <p:cNvPr id="1" name=""/>
+        <p:cNvGrpSpPr/>
+        <p:nvPr/>
+      </p:nvGrpSpPr>
+      <p:grpSpPr>
+        <a:xfrm>
+          <a:off x="0" y="0"/>
+          <a:ext cx="0" cy="0"/>
+          <a:chOff x="0" y="0"/>
+          <a:chExt cx="0" cy="0"/>
+        </a:xfrm>
+      </p:grpSpPr>
+      <p:sp>
+        <p:nvSpPr>
+          <p:cNvPr id="2" name="Title 1">
+            <a:extLst>
+              <a:ext uri="{FF2B5EF4-FFF2-40B4-BE49-F238E27FC236}">
+                <a16:creationId xmlns:a16="http://schemas.microsoft.com/office/drawing/2014/main" id="{ECF0ABBD-1646-4677-8FD2-39D3AD390119}"/>
+              </a:ext>
+            </a:extLst>
+          </p:cNvPr>
+          <p:cNvSpPr>
+            <a:spLocks noGrp="1"/>
+          </p:cNvSpPr>
+          <p:nvPr>
+            <p:ph type="title"/>
+          </p:nvPr>
+        </p:nvSpPr>
+        <p:spPr/>
+        <p:txBody>
+          <a:bodyPr/>
+          <a:lstStyle/>
+          <a:p>
+            <a:pPr algn="ctr"/>
+            <a:r>
+              <a:rPr lang="en-US" b="1" dirty="0"/>
+              <a:t>Consumer Insights / Summary</a:t>
             </a:r>
           </a:p>
         </p:txBody>
@@ -11812,13 +14018,27 @@
           <a:p>
             <a:r>
               <a:rPr lang="en-US" dirty="0"/>
-              <a:t>Two-wheel drive is more efficient than four-wheel drive</a:t>
+              <a:t>Two-wheel drive is </a:t>
+            </a:r>
+            <a:r>
+              <a:rPr lang="en-US"/>
+              <a:t>more fuel-efficient </a:t>
+            </a:r>
+            <a:r>
+              <a:rPr lang="en-US" dirty="0"/>
+              <a:t>than four-wheel drive</a:t>
             </a:r>
           </a:p>
           <a:p>
             <a:r>
               <a:rPr lang="en-US" dirty="0"/>
               <a:t>Front-wheel drive gives better mileage than rear-wheel drive</a:t>
+            </a:r>
+          </a:p>
+          <a:p>
+            <a:r>
+              <a:rPr lang="en-US" dirty="0"/>
+              <a:t>Four-wheel drive gives better mileage than all-wheel drive</a:t>
             </a:r>
           </a:p>
           <a:p>
@@ -12625,7 +14845,7 @@
           <a:p>
             <a:r>
               <a:rPr lang="en-US" dirty="0"/>
-              <a:t>4-wheel drive and all-wheel drive have subtle differences and are similar, but 2-wheel drive is different!</a:t>
+              <a:t>4-wheel drive and all-wheel drive have subtle differences, but 2-wheel drive is much different!</a:t>
             </a:r>
           </a:p>
         </p:txBody>
@@ -12889,13 +15109,15 @@
         </p:nvSpPr>
         <p:spPr/>
         <p:txBody>
-          <a:bodyPr/>
+          <a:bodyPr>
+            <a:normAutofit/>
+          </a:bodyPr>
           <a:lstStyle/>
           <a:p>
             <a:pPr algn="ctr"/>
             <a:r>
-              <a:rPr lang="en-US" b="1" dirty="0"/>
-              <a:t>Manual vs. Automatic Transmission</a:t>
+              <a:rPr lang="en-US" sz="3600" b="1" dirty="0"/>
+              <a:t>MPG for 2WD (Front &amp; Rear)  vs. 4WD (4WD &amp; AWD)</a:t>
             </a:r>
           </a:p>
         </p:txBody>
@@ -12928,23 +15150,29 @@
           <a:p>
             <a:r>
               <a:rPr lang="en-US" dirty="0"/>
-              <a:t>Manual transmissions have better MPG than automatic transmissions (99% confidence level)</a:t>
+              <a:t>Statistically significant results at a 99% confidence level</a:t>
             </a:r>
           </a:p>
           <a:p>
-            <a:endParaRPr lang="en-US" dirty="0"/>
-          </a:p>
-          <a:p>
-            <a:endParaRPr lang="en-US" dirty="0"/>
+            <a:r>
+              <a:rPr lang="en-US" dirty="0"/>
+              <a:t>4-wheel drive and all-wheel drive have subtle differences, but 2-wheel drive is much different!</a:t>
+            </a:r>
+          </a:p>
+          <a:p>
+            <a:r>
+              <a:rPr lang="en-US" dirty="0"/>
+              <a:t>Still, it’s important to drill down between 4WD and AWD, so…</a:t>
+            </a:r>
           </a:p>
         </p:txBody>
       </p:sp>
       <p:graphicFrame>
         <p:nvGraphicFramePr>
-          <p:cNvPr id="6" name="Chart 5">
+          <p:cNvPr id="7" name="Chart 6">
             <a:extLst>
               <a:ext uri="{FF2B5EF4-FFF2-40B4-BE49-F238E27FC236}">
-                <a16:creationId xmlns:a16="http://schemas.microsoft.com/office/drawing/2014/main" id="{8C5AE900-8F5D-4C59-85CB-44D6763C68D7}"/>
+                <a16:creationId xmlns:a16="http://schemas.microsoft.com/office/drawing/2014/main" id="{294F75F0-FA7E-4652-AF27-890B5E0A2B5D}"/>
               </a:ext>
             </a:extLst>
           </p:cNvPr>
@@ -12954,14 +15182,14 @@
           <p:nvPr>
             <p:extLst>
               <p:ext uri="{D42A27DB-BD31-4B8C-83A1-F6EECF244321}">
-                <p14:modId xmlns:p14="http://schemas.microsoft.com/office/powerpoint/2010/main" val="3997737167"/>
+                <p14:modId xmlns:p14="http://schemas.microsoft.com/office/powerpoint/2010/main" val="2170886945"/>
               </p:ext>
             </p:extLst>
           </p:nvPr>
         </p:nvGraphicFramePr>
         <p:xfrm>
           <a:off x="4364183" y="1825625"/>
-          <a:ext cx="7578436" cy="4242666"/>
+          <a:ext cx="7606145" cy="4128221"/>
         </p:xfrm>
         <a:graphic>
           <a:graphicData uri="http://schemas.openxmlformats.org/drawingml/2006/chart">
@@ -12972,7 +15200,7 @@
     </p:spTree>
     <p:extLst>
       <p:ext uri="{BB962C8B-B14F-4D97-AF65-F5344CB8AC3E}">
-        <p14:creationId xmlns:p14="http://schemas.microsoft.com/office/powerpoint/2010/main" val="793772987"/>
+        <p14:creationId xmlns:p14="http://schemas.microsoft.com/office/powerpoint/2010/main" val="4138235258"/>
       </p:ext>
     </p:extLst>
   </p:cSld>

</xml_diff>

<commit_message>
Revisions to project files
</commit_message>
<xml_diff>
--- a/thinkful data analysis capstone.pptx
+++ b/thinkful data analysis capstone.pptx
@@ -1245,7 +1245,7 @@
         <c:axId val="699993776"/>
         <c:scaling>
           <c:orientation val="minMax"/>
-          <c:min val="18"/>
+          <c:min val="0"/>
         </c:scaling>
         <c:delete val="0"/>
         <c:axPos val="l"/>
@@ -2550,7 +2550,7 @@
         <c:axId val="103513712"/>
         <c:scaling>
           <c:orientation val="minMax"/>
-          <c:min val="20"/>
+          <c:min val="0"/>
         </c:scaling>
         <c:delete val="0"/>
         <c:axPos val="l"/>

</xml_diff>